<commit_message>
Improved High Level Architecture Diagram and some typos
</commit_message>
<xml_diff>
--- a/ARM Brown Bag.pptx
+++ b/ARM Brown Bag.pptx
@@ -233,7 +233,7 @@
           <a:p>
             <a:fld id="{C6680278-032E-9143-A67F-47312BD0CE18}" type="datetimeFigureOut">
               <a:rPr lang="en-US" smtClean="0"/>
-              <a:t>2/28/18</a:t>
+              <a:t>3/1/18</a:t>
             </a:fld>
             <a:endParaRPr lang="en-US"/>
           </a:p>
@@ -1746,7 +1746,73 @@
           <a:p>
             <a:r>
               <a:rPr lang="en-US" dirty="0"/>
-              <a:t>Azure has a resource manager </a:t>
+              <a:t>Azure has a resource manager to manage resources</a:t>
+            </a:r>
+          </a:p>
+          <a:p>
+            <a:endParaRPr lang="en-US" dirty="0"/>
+          </a:p>
+          <a:p>
+            <a:r>
+              <a:rPr lang="en-US" dirty="0"/>
+              <a:t>2 approaches for communicating with it. Imperative – management </a:t>
+            </a:r>
+            <a:r>
+              <a:rPr lang="en-US" dirty="0" err="1"/>
+              <a:t>api</a:t>
+            </a:r>
+            <a:r>
+              <a:rPr lang="en-US" dirty="0"/>
+              <a:t> and Templates declarative</a:t>
+            </a:r>
+          </a:p>
+          <a:p>
+            <a:endParaRPr lang="en-US" dirty="0"/>
+          </a:p>
+          <a:p>
+            <a:r>
+              <a:rPr lang="en-US" dirty="0"/>
+              <a:t>Resource manager has resource providers which are contracts between the resource fiefdom and the resource manager on how to provision resources.</a:t>
+            </a:r>
+          </a:p>
+          <a:p>
+            <a:endParaRPr lang="en-US" dirty="0"/>
+          </a:p>
+          <a:p>
+            <a:r>
+              <a:rPr lang="en-US" dirty="0"/>
+              <a:t>A template comes in is decomposed in the resource manager using the arm schemas into </a:t>
+            </a:r>
+            <a:r>
+              <a:rPr lang="en-US" dirty="0" err="1"/>
+              <a:t>calles</a:t>
+            </a:r>
+            <a:r>
+              <a:rPr lang="en-US" dirty="0"/>
+              <a:t> to resource providers the to the resource to provision </a:t>
+            </a:r>
+          </a:p>
+          <a:p>
+            <a:endParaRPr lang="en-US" dirty="0"/>
+          </a:p>
+          <a:p>
+            <a:r>
+              <a:rPr lang="en-US" dirty="0"/>
+              <a:t>This process is </a:t>
+            </a:r>
+            <a:r>
+              <a:rPr lang="en-US" dirty="0" err="1"/>
+              <a:t>async</a:t>
+            </a:r>
+            <a:r>
+              <a:rPr lang="en-US" dirty="0"/>
+              <a:t> needs to poll the libraries take of this</a:t>
+            </a:r>
+          </a:p>
+          <a:p>
+            <a:r>
+              <a:rPr lang="en-US" dirty="0"/>
+              <a:t> </a:t>
             </a:r>
           </a:p>
         </p:txBody>
@@ -4359,6 +4425,15 @@
             <a:r>
               <a:rPr lang="en-US" dirty="0"/>
               <a:t>Passed along with the templates </a:t>
+            </a:r>
+          </a:p>
+          <a:p>
+            <a:endParaRPr lang="en-US" dirty="0"/>
+          </a:p>
+          <a:p>
+            <a:r>
+              <a:rPr lang="en-US" dirty="0"/>
+              <a:t>Can override parameters at runtime </a:t>
             </a:r>
           </a:p>
         </p:txBody>
@@ -4546,7 +4621,7 @@
           <a:p>
             <a:fld id="{D91C29D7-D097-7F44-8DA4-EEDA24BF6782}" type="datetimeFigureOut">
               <a:rPr lang="en-US" smtClean="0"/>
-              <a:t>2/28/18</a:t>
+              <a:t>3/1/18</a:t>
             </a:fld>
             <a:endParaRPr lang="en-US"/>
           </a:p>
@@ -4744,7 +4819,7 @@
           <a:p>
             <a:fld id="{D91C29D7-D097-7F44-8DA4-EEDA24BF6782}" type="datetimeFigureOut">
               <a:rPr lang="en-US" smtClean="0"/>
-              <a:t>2/28/18</a:t>
+              <a:t>3/1/18</a:t>
             </a:fld>
             <a:endParaRPr lang="en-US"/>
           </a:p>
@@ -4952,7 +5027,7 @@
           <a:p>
             <a:fld id="{D91C29D7-D097-7F44-8DA4-EEDA24BF6782}" type="datetimeFigureOut">
               <a:rPr lang="en-US" smtClean="0"/>
-              <a:t>2/28/18</a:t>
+              <a:t>3/1/18</a:t>
             </a:fld>
             <a:endParaRPr lang="en-US"/>
           </a:p>
@@ -5150,7 +5225,7 @@
           <a:p>
             <a:fld id="{D91C29D7-D097-7F44-8DA4-EEDA24BF6782}" type="datetimeFigureOut">
               <a:rPr lang="en-US" smtClean="0"/>
-              <a:t>2/28/18</a:t>
+              <a:t>3/1/18</a:t>
             </a:fld>
             <a:endParaRPr lang="en-US"/>
           </a:p>
@@ -5425,7 +5500,7 @@
           <a:p>
             <a:fld id="{D91C29D7-D097-7F44-8DA4-EEDA24BF6782}" type="datetimeFigureOut">
               <a:rPr lang="en-US" smtClean="0"/>
-              <a:t>2/28/18</a:t>
+              <a:t>3/1/18</a:t>
             </a:fld>
             <a:endParaRPr lang="en-US"/>
           </a:p>
@@ -5690,7 +5765,7 @@
           <a:p>
             <a:fld id="{D91C29D7-D097-7F44-8DA4-EEDA24BF6782}" type="datetimeFigureOut">
               <a:rPr lang="en-US" smtClean="0"/>
-              <a:t>2/28/18</a:t>
+              <a:t>3/1/18</a:t>
             </a:fld>
             <a:endParaRPr lang="en-US"/>
           </a:p>
@@ -6102,7 +6177,7 @@
           <a:p>
             <a:fld id="{D91C29D7-D097-7F44-8DA4-EEDA24BF6782}" type="datetimeFigureOut">
               <a:rPr lang="en-US" smtClean="0"/>
-              <a:t>2/28/18</a:t>
+              <a:t>3/1/18</a:t>
             </a:fld>
             <a:endParaRPr lang="en-US"/>
           </a:p>
@@ -6243,7 +6318,7 @@
           <a:p>
             <a:fld id="{D91C29D7-D097-7F44-8DA4-EEDA24BF6782}" type="datetimeFigureOut">
               <a:rPr lang="en-US" smtClean="0"/>
-              <a:t>2/28/18</a:t>
+              <a:t>3/1/18</a:t>
             </a:fld>
             <a:endParaRPr lang="en-US"/>
           </a:p>
@@ -6356,7 +6431,7 @@
           <a:p>
             <a:fld id="{D91C29D7-D097-7F44-8DA4-EEDA24BF6782}" type="datetimeFigureOut">
               <a:rPr lang="en-US" smtClean="0"/>
-              <a:t>2/28/18</a:t>
+              <a:t>3/1/18</a:t>
             </a:fld>
             <a:endParaRPr lang="en-US"/>
           </a:p>
@@ -6667,7 +6742,7 @@
           <a:p>
             <a:fld id="{D91C29D7-D097-7F44-8DA4-EEDA24BF6782}" type="datetimeFigureOut">
               <a:rPr lang="en-US" smtClean="0"/>
-              <a:t>2/28/18</a:t>
+              <a:t>3/1/18</a:t>
             </a:fld>
             <a:endParaRPr lang="en-US"/>
           </a:p>
@@ -6955,7 +7030,7 @@
           <a:p>
             <a:fld id="{D91C29D7-D097-7F44-8DA4-EEDA24BF6782}" type="datetimeFigureOut">
               <a:rPr lang="en-US" smtClean="0"/>
-              <a:t>2/28/18</a:t>
+              <a:t>3/1/18</a:t>
             </a:fld>
             <a:endParaRPr lang="en-US"/>
           </a:p>
@@ -7196,7 +7271,7 @@
           <a:p>
             <a:fld id="{D91C29D7-D097-7F44-8DA4-EEDA24BF6782}" type="datetimeFigureOut">
               <a:rPr lang="en-US" smtClean="0"/>
-              <a:t>2/28/18</a:t>
+              <a:t>3/1/18</a:t>
             </a:fld>
             <a:endParaRPr lang="en-US"/>
           </a:p>
@@ -8120,7 +8195,7 @@
                   <a:schemeClr val="bg1"/>
                 </a:solidFill>
               </a:rPr>
-              <a:t>parameters(“</a:t>
+              <a:t>parameters(‘</a:t>
             </a:r>
             <a:r>
               <a:rPr lang="en-US" sz="2400" dirty="0" err="1">
@@ -8136,7 +8211,7 @@
                   <a:schemeClr val="bg1"/>
                 </a:solidFill>
               </a:rPr>
-              <a:t>”)</a:t>
+              <a:t>’)</a:t>
             </a:r>
           </a:p>
           <a:p>
@@ -8155,7 +8230,7 @@
                   <a:schemeClr val="bg1"/>
                 </a:solidFill>
               </a:rPr>
-              <a:t>”name”: ”[parameters(“</a:t>
+              <a:t>”name”: ”[parameters(‘</a:t>
             </a:r>
             <a:r>
               <a:rPr lang="en-US" sz="2400" dirty="0" err="1">
@@ -8171,7 +8246,7 @@
                   <a:schemeClr val="bg1"/>
                 </a:solidFill>
               </a:rPr>
-              <a:t>”)]”</a:t>
+              <a:t>’)]”</a:t>
             </a:r>
           </a:p>
         </p:txBody>
@@ -11557,7 +11632,7 @@
                   <a:schemeClr val="bg1"/>
                 </a:solidFill>
               </a:rPr>
-              <a:t>“property”:  “[“</a:t>
+              <a:t>“property”:  “[</a:t>
             </a:r>
             <a:r>
               <a:rPr lang="en-AU" sz="2400" dirty="0" err="1">
@@ -11573,7 +11648,7 @@
                   <a:schemeClr val="bg1"/>
                 </a:solidFill>
               </a:rPr>
-              <a:t>(‘value1’,  ‘value2’)”]”</a:t>
+              <a:t>(‘value1’,  ‘value2’)]”</a:t>
             </a:r>
           </a:p>
           <a:p>
@@ -13553,8 +13628,8 @@
         </p:nvSpPr>
         <p:spPr>
           <a:xfrm>
-            <a:off x="398640" y="2167279"/>
-            <a:ext cx="10934700" cy="2308324"/>
+            <a:off x="284340" y="1982222"/>
+            <a:ext cx="10934700" cy="3970318"/>
           </a:xfrm>
           <a:prstGeom prst="rect">
             <a:avLst/>
@@ -13714,7 +13789,7 @@
           </a:p>
           <a:p>
             <a:r>
-              <a:rPr lang="en-US" dirty="0">
+              <a:rPr lang="en-AU" dirty="0">
                 <a:solidFill>
                   <a:schemeClr val="bg1"/>
                 </a:solidFill>
@@ -13722,7 +13797,7 @@
               <a:t>New-</a:t>
             </a:r>
             <a:r>
-              <a:rPr lang="en-US" dirty="0" err="1">
+              <a:rPr lang="en-AU" dirty="0" err="1">
                 <a:solidFill>
                   <a:schemeClr val="bg1"/>
                 </a:solidFill>
@@ -13730,39 +13805,61 @@
               <a:t>AzureRmResourceGroupDeployment</a:t>
             </a:r>
             <a:r>
-              <a:rPr lang="en-US" dirty="0">
+              <a:rPr lang="en-AU" dirty="0">
                 <a:solidFill>
                   <a:schemeClr val="bg1"/>
                 </a:solidFill>
               </a:rPr>
-              <a:t> -Name </a:t>
-            </a:r>
-            <a:r>
-              <a:rPr lang="en-US" dirty="0" err="1">
+              <a:t> `</a:t>
+            </a:r>
+          </a:p>
+          <a:p>
+            <a:pPr lvl="1"/>
+            <a:r>
+              <a:rPr lang="en-AU" dirty="0">
                 <a:solidFill>
                   <a:schemeClr val="bg1"/>
                 </a:solidFill>
               </a:rPr>
+              <a:t>-Name </a:t>
+            </a:r>
+            <a:r>
+              <a:rPr lang="en-AU" dirty="0" err="1">
+                <a:solidFill>
+                  <a:schemeClr val="bg1"/>
+                </a:solidFill>
+              </a:rPr>
               <a:t>ExampleDeployment</a:t>
             </a:r>
             <a:r>
-              <a:rPr lang="en-US" dirty="0">
+              <a:rPr lang="en-AU" dirty="0">
                 <a:solidFill>
                   <a:schemeClr val="bg1"/>
                 </a:solidFill>
               </a:rPr>
-              <a:t> -</a:t>
-            </a:r>
-            <a:r>
-              <a:rPr lang="en-US" dirty="0" err="1">
+              <a:t> `</a:t>
+            </a:r>
+          </a:p>
+          <a:p>
+            <a:pPr lvl="1"/>
+            <a:r>
+              <a:rPr lang="en-AU" dirty="0">
                 <a:solidFill>
                   <a:schemeClr val="bg1"/>
                 </a:solidFill>
               </a:rPr>
+              <a:t>-</a:t>
+            </a:r>
+            <a:r>
+              <a:rPr lang="en-AU" dirty="0" err="1">
+                <a:solidFill>
+                  <a:schemeClr val="bg1"/>
+                </a:solidFill>
+              </a:rPr>
               <a:t>ResourceGroupName</a:t>
             </a:r>
             <a:r>
-              <a:rPr lang="en-US" dirty="0">
+              <a:rPr lang="en-AU" dirty="0">
                 <a:solidFill>
                   <a:schemeClr val="bg1"/>
                 </a:solidFill>
@@ -13770,98 +13867,140 @@
               <a:t> </a:t>
             </a:r>
             <a:r>
-              <a:rPr lang="en-US" dirty="0" err="1">
+              <a:rPr lang="en-AU" dirty="0" err="1">
                 <a:solidFill>
                   <a:schemeClr val="bg1"/>
                 </a:solidFill>
               </a:rPr>
-              <a:t>ExampleResourceGroup</a:t>
-            </a:r>
-            <a:r>
-              <a:rPr lang="en-US" dirty="0">
+              <a:t>ExampleGroup</a:t>
+            </a:r>
+            <a:r>
+              <a:rPr lang="en-AU" dirty="0">
                 <a:solidFill>
                   <a:schemeClr val="bg1"/>
                 </a:solidFill>
               </a:rPr>
-              <a:t> `  -</a:t>
-            </a:r>
-            <a:r>
-              <a:rPr lang="en-US" dirty="0" err="1">
+              <a:t> `</a:t>
+            </a:r>
+          </a:p>
+          <a:p>
+            <a:pPr lvl="1"/>
+            <a:r>
+              <a:rPr lang="en-AU" dirty="0">
                 <a:solidFill>
                   <a:schemeClr val="bg1"/>
                 </a:solidFill>
               </a:rPr>
+              <a:t>-</a:t>
+            </a:r>
+            <a:r>
+              <a:rPr lang="en-AU" dirty="0" err="1">
+                <a:solidFill>
+                  <a:schemeClr val="bg1"/>
+                </a:solidFill>
+              </a:rPr>
               <a:t>TemplateFile</a:t>
             </a:r>
             <a:r>
-              <a:rPr lang="en-US" dirty="0">
+              <a:rPr lang="en-AU" dirty="0">
                 <a:solidFill>
                   <a:schemeClr val="bg1"/>
                 </a:solidFill>
               </a:rPr>
-              <a:t> c:\</a:t>
-            </a:r>
-            <a:r>
-              <a:rPr lang="en-US" dirty="0" err="1">
+              <a:t> </a:t>
+            </a:r>
+            <a:r>
+              <a:rPr lang="en-AU" dirty="0" err="1">
                 <a:solidFill>
                   <a:schemeClr val="bg1"/>
                 </a:solidFill>
               </a:rPr>
-              <a:t>MyTemplates</a:t>
-            </a:r>
-            <a:r>
-              <a:rPr lang="en-US" dirty="0">
+              <a:t>template.json</a:t>
+            </a:r>
+            <a:r>
+              <a:rPr lang="en-AU" dirty="0">
                 <a:solidFill>
                   <a:schemeClr val="bg1"/>
                 </a:solidFill>
               </a:rPr>
-              <a:t>\</a:t>
-            </a:r>
-            <a:r>
-              <a:rPr lang="en-US" dirty="0" err="1">
+              <a:t> `</a:t>
+            </a:r>
+          </a:p>
+          <a:p>
+            <a:pPr lvl="1"/>
+            <a:r>
+              <a:rPr lang="en-AU" dirty="0">
                 <a:solidFill>
                   <a:schemeClr val="bg1"/>
                 </a:solidFill>
               </a:rPr>
-              <a:t>storage.json</a:t>
-            </a:r>
-            <a:r>
-              <a:rPr lang="en-US" dirty="0">
+              <a:t>-</a:t>
+            </a:r>
+            <a:r>
+              <a:rPr lang="en-AU" dirty="0" err="1">
                 <a:solidFill>
                   <a:schemeClr val="bg1"/>
                 </a:solidFill>
               </a:rPr>
-              <a:t> -</a:t>
-            </a:r>
-            <a:r>
-              <a:rPr lang="en-US" dirty="0" err="1">
+              <a:t>TemplateParameterFile</a:t>
+            </a:r>
+            <a:r>
+              <a:rPr lang="en-AU" dirty="0">
                 <a:solidFill>
                   <a:schemeClr val="bg1"/>
                 </a:solidFill>
               </a:rPr>
-              <a:t>storageAccountType</a:t>
-            </a:r>
-            <a:r>
-              <a:rPr lang="en-US" dirty="0">
+              <a:t> </a:t>
+            </a:r>
+            <a:r>
+              <a:rPr lang="en-AU" dirty="0" err="1">
                 <a:solidFill>
                   <a:schemeClr val="bg1"/>
                 </a:solidFill>
               </a:rPr>
-              <a:t> </a:t>
-            </a:r>
-            <a:r>
-              <a:rPr lang="en-US" dirty="0" err="1">
+              <a:t>params.test.json</a:t>
+            </a:r>
+            <a:r>
+              <a:rPr lang="en-AU" dirty="0">
                 <a:solidFill>
                   <a:schemeClr val="bg1"/>
                 </a:solidFill>
               </a:rPr>
-              <a:t>Standard_GRS</a:t>
-            </a:r>
-            <a:endParaRPr lang="en-US" dirty="0">
-              <a:solidFill>
-                <a:schemeClr val="bg1"/>
-              </a:solidFill>
-            </a:endParaRPr>
+              <a:t> `</a:t>
+            </a:r>
+          </a:p>
+          <a:p>
+            <a:pPr lvl="1"/>
+            <a:r>
+              <a:rPr lang="en-AU" dirty="0">
+                <a:solidFill>
+                  <a:schemeClr val="bg1"/>
+                </a:solidFill>
+              </a:rPr>
+              <a:t>-Mode Complete `</a:t>
+            </a:r>
+          </a:p>
+          <a:p>
+            <a:pPr lvl="1"/>
+            <a:r>
+              <a:rPr lang="en-AU" dirty="0">
+                <a:solidFill>
+                  <a:schemeClr val="bg1"/>
+                </a:solidFill>
+              </a:rPr>
+              <a:t>-Force `</a:t>
+            </a:r>
+          </a:p>
+          <a:p>
+            <a:pPr lvl="1"/>
+            <a:r>
+              <a:rPr lang="en-AU" dirty="0">
+                <a:solidFill>
+                  <a:schemeClr val="bg1"/>
+                </a:solidFill>
+              </a:rPr>
+              <a:t>-Verbose</a:t>
+            </a:r>
           </a:p>
         </p:txBody>
       </p:sp>
@@ -14058,7 +14197,224 @@
                                         <p:tgtEl>
                                           <p:spTgt spid="6">
                                             <p:txEl>
-                                              <p:pRg st="6" end="6"/>
+                                              <p:charRg st="176" end="213"/>
+                                            </p:txEl>
+                                          </p:spTgt>
+                                        </p:tgtEl>
+                                        <p:attrNameLst>
+                                          <p:attrName>style.visibility</p:attrName>
+                                        </p:attrNameLst>
+                                      </p:cBhvr>
+                                      <p:to>
+                                        <p:strVal val="visible"/>
+                                      </p:to>
+                                    </p:set>
+                                  </p:childTnLst>
+                                </p:cTn>
+                              </p:par>
+                              <p:par>
+                                <p:cTn id="19" presetID="1" presetClass="entr" presetSubtype="0" fill="hold" nodeType="withEffect">
+                                  <p:stCondLst>
+                                    <p:cond delay="0"/>
+                                  </p:stCondLst>
+                                  <p:childTnLst>
+                                    <p:set>
+                                      <p:cBhvr>
+                                        <p:cTn id="20" dur="1" fill="hold">
+                                          <p:stCondLst>
+                                            <p:cond delay="0"/>
+                                          </p:stCondLst>
+                                        </p:cTn>
+                                        <p:tgtEl>
+                                          <p:spTgt spid="6">
+                                            <p:txEl>
+                                              <p:charRg st="213" end="239"/>
+                                            </p:txEl>
+                                          </p:spTgt>
+                                        </p:tgtEl>
+                                        <p:attrNameLst>
+                                          <p:attrName>style.visibility</p:attrName>
+                                        </p:attrNameLst>
+                                      </p:cBhvr>
+                                      <p:to>
+                                        <p:strVal val="visible"/>
+                                      </p:to>
+                                    </p:set>
+                                  </p:childTnLst>
+                                </p:cTn>
+                              </p:par>
+                              <p:par>
+                                <p:cTn id="21" presetID="1" presetClass="entr" presetSubtype="0" fill="hold" nodeType="withEffect">
+                                  <p:stCondLst>
+                                    <p:cond delay="0"/>
+                                  </p:stCondLst>
+                                  <p:childTnLst>
+                                    <p:set>
+                                      <p:cBhvr>
+                                        <p:cTn id="22" dur="1" fill="hold">
+                                          <p:stCondLst>
+                                            <p:cond delay="0"/>
+                                          </p:stCondLst>
+                                        </p:cTn>
+                                        <p:tgtEl>
+                                          <p:spTgt spid="6">
+                                            <p:txEl>
+                                              <p:charRg st="239" end="273"/>
+                                            </p:txEl>
+                                          </p:spTgt>
+                                        </p:tgtEl>
+                                        <p:attrNameLst>
+                                          <p:attrName>style.visibility</p:attrName>
+                                        </p:attrNameLst>
+                                      </p:cBhvr>
+                                      <p:to>
+                                        <p:strVal val="visible"/>
+                                      </p:to>
+                                    </p:set>
+                                  </p:childTnLst>
+                                </p:cTn>
+                              </p:par>
+                              <p:par>
+                                <p:cTn id="23" presetID="1" presetClass="entr" presetSubtype="0" fill="hold" nodeType="withEffect">
+                                  <p:stCondLst>
+                                    <p:cond delay="0"/>
+                                  </p:stCondLst>
+                                  <p:childTnLst>
+                                    <p:set>
+                                      <p:cBhvr>
+                                        <p:cTn id="24" dur="1" fill="hold">
+                                          <p:stCondLst>
+                                            <p:cond delay="0"/>
+                                          </p:stCondLst>
+                                        </p:cTn>
+                                        <p:tgtEl>
+                                          <p:spTgt spid="6">
+                                            <p:txEl>
+                                              <p:charRg st="273" end="303"/>
+                                            </p:txEl>
+                                          </p:spTgt>
+                                        </p:tgtEl>
+                                        <p:attrNameLst>
+                                          <p:attrName>style.visibility</p:attrName>
+                                        </p:attrNameLst>
+                                      </p:cBhvr>
+                                      <p:to>
+                                        <p:strVal val="visible"/>
+                                      </p:to>
+                                    </p:set>
+                                  </p:childTnLst>
+                                </p:cTn>
+                              </p:par>
+                              <p:par>
+                                <p:cTn id="25" presetID="1" presetClass="entr" presetSubtype="0" fill="hold" nodeType="withEffect">
+                                  <p:stCondLst>
+                                    <p:cond delay="0"/>
+                                  </p:stCondLst>
+                                  <p:childTnLst>
+                                    <p:set>
+                                      <p:cBhvr>
+                                        <p:cTn id="26" dur="1" fill="hold">
+                                          <p:stCondLst>
+                                            <p:cond delay="0"/>
+                                          </p:stCondLst>
+                                        </p:cTn>
+                                        <p:tgtEl>
+                                          <p:spTgt spid="6">
+                                            <p:txEl>
+                                              <p:charRg st="303" end="345"/>
+                                            </p:txEl>
+                                          </p:spTgt>
+                                        </p:tgtEl>
+                                        <p:attrNameLst>
+                                          <p:attrName>style.visibility</p:attrName>
+                                        </p:attrNameLst>
+                                      </p:cBhvr>
+                                      <p:to>
+                                        <p:strVal val="visible"/>
+                                      </p:to>
+                                    </p:set>
+                                  </p:childTnLst>
+                                </p:cTn>
+                              </p:par>
+                              <p:par>
+                                <p:cTn id="27" presetID="1" presetClass="entr" presetSubtype="0" fill="hold" nodeType="withEffect">
+                                  <p:stCondLst>
+                                    <p:cond delay="0"/>
+                                  </p:stCondLst>
+                                  <p:childTnLst>
+                                    <p:set>
+                                      <p:cBhvr>
+                                        <p:cTn id="28" dur="1" fill="hold">
+                                          <p:stCondLst>
+                                            <p:cond delay="0"/>
+                                          </p:stCondLst>
+                                        </p:cTn>
+                                        <p:tgtEl>
+                                          <p:spTgt spid="6">
+                                            <p:txEl>
+                                              <p:charRg st="345" end="362"/>
+                                            </p:txEl>
+                                          </p:spTgt>
+                                        </p:tgtEl>
+                                        <p:attrNameLst>
+                                          <p:attrName>style.visibility</p:attrName>
+                                        </p:attrNameLst>
+                                      </p:cBhvr>
+                                      <p:to>
+                                        <p:strVal val="visible"/>
+                                      </p:to>
+                                    </p:set>
+                                  </p:childTnLst>
+                                </p:cTn>
+                              </p:par>
+                              <p:par>
+                                <p:cTn id="29" presetID="1" presetClass="entr" presetSubtype="0" fill="hold" nodeType="withEffect">
+                                  <p:stCondLst>
+                                    <p:cond delay="0"/>
+                                  </p:stCondLst>
+                                  <p:childTnLst>
+                                    <p:set>
+                                      <p:cBhvr>
+                                        <p:cTn id="30" dur="1" fill="hold">
+                                          <p:stCondLst>
+                                            <p:cond delay="0"/>
+                                          </p:stCondLst>
+                                        </p:cTn>
+                                        <p:tgtEl>
+                                          <p:spTgt spid="6">
+                                            <p:txEl>
+                                              <p:charRg st="362" end="371"/>
+                                            </p:txEl>
+                                          </p:spTgt>
+                                        </p:tgtEl>
+                                        <p:attrNameLst>
+                                          <p:attrName>style.visibility</p:attrName>
+                                        </p:attrNameLst>
+                                      </p:cBhvr>
+                                      <p:to>
+                                        <p:strVal val="visible"/>
+                                      </p:to>
+                                    </p:set>
+                                  </p:childTnLst>
+                                </p:cTn>
+                              </p:par>
+                              <p:par>
+                                <p:cTn id="31" presetID="1" presetClass="entr" presetSubtype="0" fill="hold" nodeType="withEffect">
+                                  <p:stCondLst>
+                                    <p:cond delay="0"/>
+                                  </p:stCondLst>
+                                  <p:childTnLst>
+                                    <p:set>
+                                      <p:cBhvr>
+                                        <p:cTn id="32" dur="1" fill="hold">
+                                          <p:stCondLst>
+                                            <p:cond delay="0"/>
+                                          </p:stCondLst>
+                                        </p:cTn>
+                                        <p:tgtEl>
+                                          <p:spTgt spid="6">
+                                            <p:txEl>
+                                              <p:charRg st="371" end="380"/>
                                             </p:txEl>
                                           </p:spTgt>
                                         </p:tgtEl>
@@ -14345,7 +14701,7 @@
         <p:spPr>
           <a:xfrm>
             <a:off x="355600" y="2136339"/>
-            <a:ext cx="10934700" cy="2585323"/>
+            <a:ext cx="10934700" cy="3139321"/>
           </a:xfrm>
           <a:prstGeom prst="rect">
             <a:avLst/>
@@ -14427,7 +14783,7 @@
           </a:p>
           <a:p>
             <a:r>
-              <a:rPr lang="en-US" dirty="0" err="1">
+              <a:rPr lang="en-AU" dirty="0" err="1">
                 <a:solidFill>
                   <a:srgbClr val="00FF00"/>
                 </a:solidFill>
@@ -14435,25 +14791,26 @@
               <a:t>az</a:t>
             </a:r>
             <a:r>
-              <a:rPr lang="en-US" dirty="0">
+              <a:rPr lang="en-AU" dirty="0">
                 <a:solidFill>
                   <a:srgbClr val="00FF00"/>
                 </a:solidFill>
               </a:rPr>
-              <a:t> group deployment create \  </a:t>
-            </a:r>
-          </a:p>
-          <a:p>
-            <a:r>
-              <a:rPr lang="en-US" dirty="0">
+              <a:t> group deployment create \</a:t>
+            </a:r>
+          </a:p>
+          <a:p>
+            <a:pPr lvl="1"/>
+            <a:r>
+              <a:rPr lang="en-AU" dirty="0">
                 <a:solidFill>
                   <a:srgbClr val="00FF00"/>
                 </a:solidFill>
               </a:rPr>
-              <a:t>       --name </a:t>
-            </a:r>
-            <a:r>
-              <a:rPr lang="en-US" dirty="0" err="1">
+              <a:t>--name </a:t>
+            </a:r>
+            <a:r>
+              <a:rPr lang="en-AU" dirty="0" err="1">
                 <a:solidFill>
                   <a:srgbClr val="00FF00"/>
                 </a:solidFill>
@@ -14461,25 +14818,26 @@
               <a:t>ExampleDeployment</a:t>
             </a:r>
             <a:r>
-              <a:rPr lang="en-US" dirty="0">
+              <a:rPr lang="en-AU" dirty="0">
                 <a:solidFill>
                   <a:srgbClr val="00FF00"/>
                 </a:solidFill>
               </a:rPr>
-              <a:t> \  </a:t>
-            </a:r>
-          </a:p>
-          <a:p>
-            <a:r>
-              <a:rPr lang="en-US" dirty="0">
+              <a:t> \</a:t>
+            </a:r>
+          </a:p>
+          <a:p>
+            <a:pPr lvl="1"/>
+            <a:r>
+              <a:rPr lang="en-AU" dirty="0">
                 <a:solidFill>
                   <a:srgbClr val="00FF00"/>
                 </a:solidFill>
               </a:rPr>
-              <a:t>       --resource-group </a:t>
-            </a:r>
-            <a:r>
-              <a:rPr lang="en-US" dirty="0" err="1">
+              <a:t>--resource-group </a:t>
+            </a:r>
+            <a:r>
+              <a:rPr lang="en-AU" dirty="0" err="1">
                 <a:solidFill>
                   <a:srgbClr val="00FF00"/>
                 </a:solidFill>
@@ -14487,78 +14845,89 @@
               <a:t>ExampleGroup</a:t>
             </a:r>
             <a:r>
-              <a:rPr lang="en-US" dirty="0">
+              <a:rPr lang="en-AU" dirty="0">
                 <a:solidFill>
                   <a:srgbClr val="00FF00"/>
                 </a:solidFill>
               </a:rPr>
-              <a:t> \   </a:t>
-            </a:r>
-          </a:p>
-          <a:p>
-            <a:r>
-              <a:rPr lang="en-US" dirty="0">
+              <a:t> \</a:t>
+            </a:r>
+          </a:p>
+          <a:p>
+            <a:pPr lvl="1"/>
+            <a:r>
+              <a:rPr lang="en-AU" dirty="0">
                 <a:solidFill>
                   <a:srgbClr val="00FF00"/>
                 </a:solidFill>
               </a:rPr>
-              <a:t>       --template-file </a:t>
-            </a:r>
-            <a:r>
-              <a:rPr lang="en-US" dirty="0" err="1">
+              <a:t>--template-file </a:t>
+            </a:r>
+            <a:r>
+              <a:rPr lang="en-AU" dirty="0" err="1">
                 <a:solidFill>
                   <a:srgbClr val="00FF00"/>
                 </a:solidFill>
               </a:rPr>
-              <a:t>storage.json</a:t>
-            </a:r>
-            <a:r>
-              <a:rPr lang="en-US" dirty="0">
+              <a:t>template.json</a:t>
+            </a:r>
+            <a:r>
+              <a:rPr lang="en-AU" dirty="0">
                 <a:solidFill>
                   <a:srgbClr val="00FF00"/>
                 </a:solidFill>
               </a:rPr>
-              <a:t> \   </a:t>
-            </a:r>
-          </a:p>
-          <a:p>
-            <a:r>
-              <a:rPr lang="en-US" dirty="0">
+              <a:t> \</a:t>
+            </a:r>
+          </a:p>
+          <a:p>
+            <a:pPr lvl="1"/>
+            <a:r>
+              <a:rPr lang="en-AU" dirty="0">
                 <a:solidFill>
                   <a:srgbClr val="00FF00"/>
                 </a:solidFill>
               </a:rPr>
-              <a:t>       --parameters </a:t>
-            </a:r>
-            <a:r>
-              <a:rPr lang="en-US" dirty="0" err="1">
+              <a:t>--parameters @</a:t>
+            </a:r>
+            <a:r>
+              <a:rPr lang="en-AU" dirty="0" err="1">
                 <a:solidFill>
                   <a:srgbClr val="00FF00"/>
                 </a:solidFill>
               </a:rPr>
-              <a:t>storageAccountType</a:t>
-            </a:r>
-            <a:r>
-              <a:rPr lang="en-US" dirty="0">
+              <a:t>params.test.json</a:t>
+            </a:r>
+            <a:r>
+              <a:rPr lang="en-AU" dirty="0">
                 <a:solidFill>
                   <a:srgbClr val="00FF00"/>
                 </a:solidFill>
               </a:rPr>
-              <a:t>=</a:t>
-            </a:r>
-            <a:r>
-              <a:rPr lang="en-US" dirty="0" err="1">
+              <a:t> \</a:t>
+            </a:r>
+          </a:p>
+          <a:p>
+            <a:pPr lvl="1"/>
+            <a:r>
+              <a:rPr lang="en-AU" dirty="0">
                 <a:solidFill>
                   <a:srgbClr val="00FF00"/>
                 </a:solidFill>
               </a:rPr>
-              <a:t>Standard_GRS</a:t>
-            </a:r>
-            <a:endParaRPr lang="en-US" dirty="0">
-              <a:solidFill>
-                <a:srgbClr val="00FF00"/>
-              </a:solidFill>
-            </a:endParaRPr>
+              <a:t>--mode Complete \</a:t>
+            </a:r>
+          </a:p>
+          <a:p>
+            <a:pPr lvl="1"/>
+            <a:r>
+              <a:rPr lang="en-AU" dirty="0">
+                <a:solidFill>
+                  <a:srgbClr val="00FF00"/>
+                </a:solidFill>
+              </a:rPr>
+              <a:t>--verbose</a:t>
+            </a:r>
           </a:p>
         </p:txBody>
       </p:sp>
@@ -14678,179 +15047,6 @@
                       </p:childTnLst>
                     </p:cTn>
                   </p:par>
-                  <p:par>
-                    <p:cTn id="11" fill="hold">
-                      <p:stCondLst>
-                        <p:cond delay="indefinite"/>
-                      </p:stCondLst>
-                      <p:childTnLst>
-                        <p:par>
-                          <p:cTn id="12" fill="hold">
-                            <p:stCondLst>
-                              <p:cond delay="0"/>
-                            </p:stCondLst>
-                            <p:childTnLst>
-                              <p:par>
-                                <p:cTn id="13" presetID="1" presetClass="entr" presetSubtype="0" fill="hold" nodeType="clickEffect">
-                                  <p:stCondLst>
-                                    <p:cond delay="0"/>
-                                  </p:stCondLst>
-                                  <p:childTnLst>
-                                    <p:set>
-                                      <p:cBhvr>
-                                        <p:cTn id="14" dur="1" fill="hold">
-                                          <p:stCondLst>
-                                            <p:cond delay="0"/>
-                                          </p:stCondLst>
-                                        </p:cTn>
-                                        <p:tgtEl>
-                                          <p:spTgt spid="6">
-                                            <p:txEl>
-                                              <p:pRg st="4" end="4"/>
-                                            </p:txEl>
-                                          </p:spTgt>
-                                        </p:tgtEl>
-                                        <p:attrNameLst>
-                                          <p:attrName>style.visibility</p:attrName>
-                                        </p:attrNameLst>
-                                      </p:cBhvr>
-                                      <p:to>
-                                        <p:strVal val="visible"/>
-                                      </p:to>
-                                    </p:set>
-                                  </p:childTnLst>
-                                </p:cTn>
-                              </p:par>
-                              <p:par>
-                                <p:cTn id="15" presetID="1" presetClass="entr" presetSubtype="0" fill="hold" nodeType="withEffect">
-                                  <p:stCondLst>
-                                    <p:cond delay="0"/>
-                                  </p:stCondLst>
-                                  <p:childTnLst>
-                                    <p:set>
-                                      <p:cBhvr>
-                                        <p:cTn id="16" dur="1" fill="hold">
-                                          <p:stCondLst>
-                                            <p:cond delay="0"/>
-                                          </p:stCondLst>
-                                        </p:cTn>
-                                        <p:tgtEl>
-                                          <p:spTgt spid="6">
-                                            <p:txEl>
-                                              <p:pRg st="5" end="5"/>
-                                            </p:txEl>
-                                          </p:spTgt>
-                                        </p:tgtEl>
-                                        <p:attrNameLst>
-                                          <p:attrName>style.visibility</p:attrName>
-                                        </p:attrNameLst>
-                                      </p:cBhvr>
-                                      <p:to>
-                                        <p:strVal val="visible"/>
-                                      </p:to>
-                                    </p:set>
-                                  </p:childTnLst>
-                                </p:cTn>
-                              </p:par>
-                              <p:par>
-                                <p:cTn id="17" presetID="1" presetClass="entr" presetSubtype="0" fill="hold" nodeType="withEffect">
-                                  <p:stCondLst>
-                                    <p:cond delay="0"/>
-                                  </p:stCondLst>
-                                  <p:childTnLst>
-                                    <p:set>
-                                      <p:cBhvr>
-                                        <p:cTn id="18" dur="1" fill="hold">
-                                          <p:stCondLst>
-                                            <p:cond delay="0"/>
-                                          </p:stCondLst>
-                                        </p:cTn>
-                                        <p:tgtEl>
-                                          <p:spTgt spid="6">
-                                            <p:txEl>
-                                              <p:pRg st="6" end="6"/>
-                                            </p:txEl>
-                                          </p:spTgt>
-                                        </p:tgtEl>
-                                        <p:attrNameLst>
-                                          <p:attrName>style.visibility</p:attrName>
-                                        </p:attrNameLst>
-                                      </p:cBhvr>
-                                      <p:to>
-                                        <p:strVal val="visible"/>
-                                      </p:to>
-                                    </p:set>
-                                  </p:childTnLst>
-                                </p:cTn>
-                              </p:par>
-                              <p:par>
-                                <p:cTn id="19" presetID="1" presetClass="entr" presetSubtype="0" fill="hold" nodeType="withEffect">
-                                  <p:stCondLst>
-                                    <p:cond delay="0"/>
-                                  </p:stCondLst>
-                                  <p:childTnLst>
-                                    <p:set>
-                                      <p:cBhvr>
-                                        <p:cTn id="20" dur="1" fill="hold">
-                                          <p:stCondLst>
-                                            <p:cond delay="0"/>
-                                          </p:stCondLst>
-                                        </p:cTn>
-                                        <p:tgtEl>
-                                          <p:spTgt spid="6">
-                                            <p:txEl>
-                                              <p:pRg st="7" end="7"/>
-                                            </p:txEl>
-                                          </p:spTgt>
-                                        </p:tgtEl>
-                                        <p:attrNameLst>
-                                          <p:attrName>style.visibility</p:attrName>
-                                        </p:attrNameLst>
-                                      </p:cBhvr>
-                                      <p:to>
-                                        <p:strVal val="visible"/>
-                                      </p:to>
-                                    </p:set>
-                                  </p:childTnLst>
-                                </p:cTn>
-                              </p:par>
-                              <p:par>
-                                <p:cTn id="21" presetID="1" presetClass="entr" presetSubtype="0" fill="hold" nodeType="withEffect">
-                                  <p:stCondLst>
-                                    <p:cond delay="0"/>
-                                  </p:stCondLst>
-                                  <p:childTnLst>
-                                    <p:set>
-                                      <p:cBhvr>
-                                        <p:cTn id="22" dur="1" fill="hold">
-                                          <p:stCondLst>
-                                            <p:cond delay="0"/>
-                                          </p:stCondLst>
-                                        </p:cTn>
-                                        <p:tgtEl>
-                                          <p:spTgt spid="6">
-                                            <p:txEl>
-                                              <p:pRg st="8" end="8"/>
-                                            </p:txEl>
-                                          </p:spTgt>
-                                        </p:tgtEl>
-                                        <p:attrNameLst>
-                                          <p:attrName>style.visibility</p:attrName>
-                                        </p:attrNameLst>
-                                      </p:cBhvr>
-                                      <p:to>
-                                        <p:strVal val="visible"/>
-                                      </p:to>
-                                    </p:set>
-                                  </p:childTnLst>
-                                </p:cTn>
-                              </p:par>
-                            </p:childTnLst>
-                          </p:cTn>
-                        </p:par>
-                      </p:childTnLst>
-                    </p:cTn>
-                  </p:par>
                 </p:childTnLst>
               </p:cTn>
               <p:prevCondLst>
@@ -15066,7 +15262,7 @@
                   <a:schemeClr val="bg1"/>
                 </a:solidFill>
               </a:rPr>
-              <a:t>parameter.prod.json</a:t>
+              <a:t>parameters.prod.json</a:t>
             </a:r>
             <a:endParaRPr lang="en-US" sz="2400" dirty="0">
               <a:solidFill>
@@ -19266,104 +19462,816 @@
       </p:sp>
       <p:sp>
         <p:nvSpPr>
-          <p:cNvPr id="3" name="AutoShape 2" descr="Image result for wot meme">
-            <a:extLst>
-              <a:ext uri="{FF2B5EF4-FFF2-40B4-BE49-F238E27FC236}">
-                <a16:creationId xmlns:a16="http://schemas.microsoft.com/office/drawing/2014/main" id="{657AE6F2-158B-F441-B5DE-1024D0D40C41}"/>
-              </a:ext>
-            </a:extLst>
-          </p:cNvPr>
-          <p:cNvSpPr>
-            <a:spLocks noChangeAspect="1" noChangeArrowheads="1"/>
-          </p:cNvSpPr>
+          <p:cNvPr id="4" name="Rectangle 3">
+            <a:extLst>
+              <a:ext uri="{FF2B5EF4-FFF2-40B4-BE49-F238E27FC236}">
+                <a16:creationId xmlns:a16="http://schemas.microsoft.com/office/drawing/2014/main" id="{5F229328-9354-C44A-9FBF-611493FAF24B}"/>
+              </a:ext>
+            </a:extLst>
+          </p:cNvPr>
+          <p:cNvSpPr/>
           <p:nvPr/>
         </p:nvSpPr>
-        <p:spPr bwMode="auto">
+        <p:spPr>
           <a:xfrm>
-            <a:off x="5943600" y="3276600"/>
-            <a:ext cx="304800" cy="304800"/>
+            <a:off x="1929428" y="356175"/>
+            <a:ext cx="1454046" cy="494675"/>
           </a:xfrm>
           <a:prstGeom prst="rect">
             <a:avLst/>
           </a:prstGeom>
           <a:noFill/>
-          <a:extLst>
-            <a:ext uri="{909E8E84-426E-40DD-AFC4-6F175D3DCCD1}">
-              <a14:hiddenFill xmlns:a14="http://schemas.microsoft.com/office/drawing/2010/main">
-                <a:solidFill>
-                  <a:srgbClr val="FFFFFF"/>
-                </a:solidFill>
-              </a14:hiddenFill>
-            </a:ext>
-          </a:extLst>
+          <a:ln w="57150">
+            <a:solidFill>
+              <a:srgbClr val="00FFF8"/>
+            </a:solidFill>
+          </a:ln>
         </p:spPr>
-        <p:txBody>
-          <a:bodyPr vert="horz" wrap="square" lIns="91440" tIns="45720" rIns="91440" bIns="45720" numCol="1" anchor="t" anchorCtr="0" compatLnSpc="1">
-            <a:prstTxWarp prst="textNoShape">
-              <a:avLst/>
-            </a:prstTxWarp>
-          </a:bodyPr>
+        <p:style>
+          <a:lnRef idx="2">
+            <a:schemeClr val="accent1">
+              <a:shade val="50000"/>
+            </a:schemeClr>
+          </a:lnRef>
+          <a:fillRef idx="1">
+            <a:schemeClr val="accent1"/>
+          </a:fillRef>
+          <a:effectRef idx="0">
+            <a:schemeClr val="accent1"/>
+          </a:effectRef>
+          <a:fontRef idx="minor">
+            <a:schemeClr val="lt1"/>
+          </a:fontRef>
+        </p:style>
+        <p:txBody>
+          <a:bodyPr rtlCol="0" anchor="ctr"/>
           <a:lstStyle/>
           <a:p>
-            <a:endParaRPr lang="en-US"/>
-          </a:p>
-        </p:txBody>
-      </p:sp>
-      <p:pic>
-        <p:nvPicPr>
-          <p:cNvPr id="7" name="Picture 6">
-            <a:extLst>
-              <a:ext uri="{FF2B5EF4-FFF2-40B4-BE49-F238E27FC236}">
-                <a16:creationId xmlns:a16="http://schemas.microsoft.com/office/drawing/2014/main" id="{BD54C904-91F4-6043-AA80-D6F115E47D3C}"/>
-              </a:ext>
-            </a:extLst>
-          </p:cNvPr>
-          <p:cNvPicPr>
-            <a:picLocks noChangeAspect="1"/>
-          </p:cNvPicPr>
+            <a:pPr algn="ctr"/>
+            <a:r>
+              <a:rPr lang="en-US" dirty="0" err="1">
+                <a:solidFill>
+                  <a:schemeClr val="bg1"/>
+                </a:solidFill>
+              </a:rPr>
+              <a:t>powershell</a:t>
+            </a:r>
+            <a:endParaRPr lang="en-US" dirty="0">
+              <a:solidFill>
+                <a:schemeClr val="bg1"/>
+              </a:solidFill>
+            </a:endParaRPr>
+          </a:p>
+        </p:txBody>
+      </p:sp>
+      <p:sp>
+        <p:nvSpPr>
+          <p:cNvPr id="11" name="Rectangle 10">
+            <a:extLst>
+              <a:ext uri="{FF2B5EF4-FFF2-40B4-BE49-F238E27FC236}">
+                <a16:creationId xmlns:a16="http://schemas.microsoft.com/office/drawing/2014/main" id="{E77B3448-D95A-1A4A-8D37-5C2ED123F8A4}"/>
+              </a:ext>
+            </a:extLst>
+          </p:cNvPr>
+          <p:cNvSpPr/>
           <p:nvPr/>
-        </p:nvPicPr>
-        <p:blipFill>
-          <a:blip r:embed="rId3"/>
-          <a:stretch>
-            <a:fillRect/>
-          </a:stretch>
-        </p:blipFill>
+        </p:nvSpPr>
         <p:spPr>
           <a:xfrm>
-            <a:off x="2162834" y="1291203"/>
-            <a:ext cx="7561531" cy="4580394"/>
+            <a:off x="3550170" y="356177"/>
+            <a:ext cx="1454046" cy="494675"/>
           </a:xfrm>
           <a:prstGeom prst="rect">
             <a:avLst/>
           </a:prstGeom>
+          <a:noFill/>
+          <a:ln w="57150">
+            <a:solidFill>
+              <a:srgbClr val="00FFF8"/>
+            </a:solidFill>
+          </a:ln>
         </p:spPr>
-      </p:pic>
+        <p:style>
+          <a:lnRef idx="2">
+            <a:schemeClr val="accent1">
+              <a:shade val="50000"/>
+            </a:schemeClr>
+          </a:lnRef>
+          <a:fillRef idx="1">
+            <a:schemeClr val="accent1"/>
+          </a:fillRef>
+          <a:effectRef idx="0">
+            <a:schemeClr val="accent1"/>
+          </a:effectRef>
+          <a:fontRef idx="minor">
+            <a:schemeClr val="lt1"/>
+          </a:fontRef>
+        </p:style>
+        <p:txBody>
+          <a:bodyPr rtlCol="0" anchor="ctr"/>
+          <a:lstStyle/>
+          <a:p>
+            <a:pPr algn="ctr"/>
+            <a:r>
+              <a:rPr lang="en-US" dirty="0"/>
+              <a:t>azure cli</a:t>
+            </a:r>
+          </a:p>
+        </p:txBody>
+      </p:sp>
+      <p:sp>
+        <p:nvSpPr>
+          <p:cNvPr id="12" name="Rectangle 11">
+            <a:extLst>
+              <a:ext uri="{FF2B5EF4-FFF2-40B4-BE49-F238E27FC236}">
+                <a16:creationId xmlns:a16="http://schemas.microsoft.com/office/drawing/2014/main" id="{E5A87B25-D252-6F49-9406-7B4D1A54E56B}"/>
+              </a:ext>
+            </a:extLst>
+          </p:cNvPr>
+          <p:cNvSpPr/>
+          <p:nvPr/>
+        </p:nvSpPr>
+        <p:spPr>
+          <a:xfrm>
+            <a:off x="5141482" y="356175"/>
+            <a:ext cx="1454046" cy="494675"/>
+          </a:xfrm>
+          <a:prstGeom prst="rect">
+            <a:avLst/>
+          </a:prstGeom>
+          <a:noFill/>
+          <a:ln w="57150">
+            <a:solidFill>
+              <a:srgbClr val="00FFF8"/>
+            </a:solidFill>
+          </a:ln>
+        </p:spPr>
+        <p:style>
+          <a:lnRef idx="2">
+            <a:schemeClr val="accent1">
+              <a:shade val="50000"/>
+            </a:schemeClr>
+          </a:lnRef>
+          <a:fillRef idx="1">
+            <a:schemeClr val="accent1"/>
+          </a:fillRef>
+          <a:effectRef idx="0">
+            <a:schemeClr val="accent1"/>
+          </a:effectRef>
+          <a:fontRef idx="minor">
+            <a:schemeClr val="lt1"/>
+          </a:fontRef>
+        </p:style>
+        <p:txBody>
+          <a:bodyPr rtlCol="0" anchor="ctr"/>
+          <a:lstStyle/>
+          <a:p>
+            <a:pPr algn="ctr"/>
+            <a:r>
+              <a:rPr lang="en-US" dirty="0"/>
+              <a:t>portal</a:t>
+            </a:r>
+          </a:p>
+        </p:txBody>
+      </p:sp>
+      <p:sp>
+        <p:nvSpPr>
+          <p:cNvPr id="5" name="Rectangle 4">
+            <a:extLst>
+              <a:ext uri="{FF2B5EF4-FFF2-40B4-BE49-F238E27FC236}">
+                <a16:creationId xmlns:a16="http://schemas.microsoft.com/office/drawing/2014/main" id="{411CAADD-93EB-D347-854A-607B15C08CFC}"/>
+              </a:ext>
+            </a:extLst>
+          </p:cNvPr>
+          <p:cNvSpPr/>
+          <p:nvPr/>
+        </p:nvSpPr>
+        <p:spPr>
+          <a:xfrm>
+            <a:off x="1374097" y="1590076"/>
+            <a:ext cx="3120453" cy="449705"/>
+          </a:xfrm>
+          <a:prstGeom prst="rect">
+            <a:avLst/>
+          </a:prstGeom>
+          <a:noFill/>
+          <a:ln w="57150">
+            <a:solidFill>
+              <a:srgbClr val="00FFF8"/>
+            </a:solidFill>
+          </a:ln>
+        </p:spPr>
+        <p:style>
+          <a:lnRef idx="2">
+            <a:schemeClr val="accent1">
+              <a:shade val="50000"/>
+            </a:schemeClr>
+          </a:lnRef>
+          <a:fillRef idx="1">
+            <a:schemeClr val="accent1"/>
+          </a:fillRef>
+          <a:effectRef idx="0">
+            <a:schemeClr val="accent1"/>
+          </a:effectRef>
+          <a:fontRef idx="minor">
+            <a:schemeClr val="lt1"/>
+          </a:fontRef>
+        </p:style>
+        <p:txBody>
+          <a:bodyPr rtlCol="0" anchor="ctr"/>
+          <a:lstStyle/>
+          <a:p>
+            <a:pPr algn="ctr"/>
+            <a:r>
+              <a:rPr lang="en-US" dirty="0"/>
+              <a:t>Management </a:t>
+            </a:r>
+            <a:r>
+              <a:rPr lang="en-US" dirty="0" err="1"/>
+              <a:t>api</a:t>
+            </a:r>
+            <a:endParaRPr lang="en-US" dirty="0"/>
+          </a:p>
+        </p:txBody>
+      </p:sp>
+      <p:sp>
+        <p:nvSpPr>
+          <p:cNvPr id="6" name="Rectangle 5">
+            <a:extLst>
+              <a:ext uri="{FF2B5EF4-FFF2-40B4-BE49-F238E27FC236}">
+                <a16:creationId xmlns:a16="http://schemas.microsoft.com/office/drawing/2014/main" id="{A9A3599B-8B50-FB47-8724-B497F63863B7}"/>
+              </a:ext>
+            </a:extLst>
+          </p:cNvPr>
+          <p:cNvSpPr/>
+          <p:nvPr/>
+        </p:nvSpPr>
+        <p:spPr>
+          <a:xfrm>
+            <a:off x="4615403" y="1566612"/>
+            <a:ext cx="3672590" cy="464695"/>
+          </a:xfrm>
+          <a:prstGeom prst="rect">
+            <a:avLst/>
+          </a:prstGeom>
+          <a:noFill/>
+          <a:ln w="57150">
+            <a:solidFill>
+              <a:srgbClr val="00FFF8"/>
+            </a:solidFill>
+          </a:ln>
+        </p:spPr>
+        <p:style>
+          <a:lnRef idx="2">
+            <a:schemeClr val="accent1">
+              <a:shade val="50000"/>
+            </a:schemeClr>
+          </a:lnRef>
+          <a:fillRef idx="1">
+            <a:schemeClr val="accent1"/>
+          </a:fillRef>
+          <a:effectRef idx="0">
+            <a:schemeClr val="accent1"/>
+          </a:effectRef>
+          <a:fontRef idx="minor">
+            <a:schemeClr val="lt1"/>
+          </a:fontRef>
+        </p:style>
+        <p:txBody>
+          <a:bodyPr rtlCol="0" anchor="ctr"/>
+          <a:lstStyle/>
+          <a:p>
+            <a:pPr algn="ctr"/>
+            <a:r>
+              <a:rPr lang="en-US" dirty="0"/>
+              <a:t>templates</a:t>
+            </a:r>
+          </a:p>
+        </p:txBody>
+      </p:sp>
+      <p:sp>
+        <p:nvSpPr>
+          <p:cNvPr id="13" name="Rectangle 12">
+            <a:extLst>
+              <a:ext uri="{FF2B5EF4-FFF2-40B4-BE49-F238E27FC236}">
+                <a16:creationId xmlns:a16="http://schemas.microsoft.com/office/drawing/2014/main" id="{B0D0E17B-80D3-DC40-A5A3-6152FB754967}"/>
+              </a:ext>
+            </a:extLst>
+          </p:cNvPr>
+          <p:cNvSpPr/>
+          <p:nvPr/>
+        </p:nvSpPr>
+        <p:spPr>
+          <a:xfrm>
+            <a:off x="1394083" y="2563244"/>
+            <a:ext cx="7005404" cy="974435"/>
+          </a:xfrm>
+          <a:prstGeom prst="rect">
+            <a:avLst/>
+          </a:prstGeom>
+          <a:noFill/>
+          <a:ln w="57150">
+            <a:solidFill>
+              <a:srgbClr val="00FFF8"/>
+            </a:solidFill>
+          </a:ln>
+        </p:spPr>
+        <p:style>
+          <a:lnRef idx="2">
+            <a:schemeClr val="accent1">
+              <a:shade val="50000"/>
+            </a:schemeClr>
+          </a:lnRef>
+          <a:fillRef idx="1">
+            <a:schemeClr val="accent1"/>
+          </a:fillRef>
+          <a:effectRef idx="0">
+            <a:schemeClr val="accent1"/>
+          </a:effectRef>
+          <a:fontRef idx="minor">
+            <a:schemeClr val="lt1"/>
+          </a:fontRef>
+        </p:style>
+        <p:txBody>
+          <a:bodyPr rtlCol="0" anchor="ctr"/>
+          <a:lstStyle/>
+          <a:p>
+            <a:pPr algn="ctr"/>
+            <a:r>
+              <a:rPr lang="en-US" dirty="0"/>
+              <a:t>Resource Manager</a:t>
+            </a:r>
+          </a:p>
+        </p:txBody>
+      </p:sp>
+      <p:sp>
+        <p:nvSpPr>
+          <p:cNvPr id="14" name="Rectangle 13">
+            <a:extLst>
+              <a:ext uri="{FF2B5EF4-FFF2-40B4-BE49-F238E27FC236}">
+                <a16:creationId xmlns:a16="http://schemas.microsoft.com/office/drawing/2014/main" id="{727DE4F6-37E1-1C48-A04C-8E1BBE377508}"/>
+              </a:ext>
+            </a:extLst>
+          </p:cNvPr>
+          <p:cNvSpPr/>
+          <p:nvPr/>
+        </p:nvSpPr>
+        <p:spPr>
+          <a:xfrm>
+            <a:off x="1374097" y="3893338"/>
+            <a:ext cx="7005404" cy="449007"/>
+          </a:xfrm>
+          <a:prstGeom prst="rect">
+            <a:avLst/>
+          </a:prstGeom>
+          <a:noFill/>
+          <a:ln w="57150">
+            <a:solidFill>
+              <a:srgbClr val="00FFF8"/>
+            </a:solidFill>
+          </a:ln>
+        </p:spPr>
+        <p:style>
+          <a:lnRef idx="2">
+            <a:schemeClr val="accent1">
+              <a:shade val="50000"/>
+            </a:schemeClr>
+          </a:lnRef>
+          <a:fillRef idx="1">
+            <a:schemeClr val="accent1"/>
+          </a:fillRef>
+          <a:effectRef idx="0">
+            <a:schemeClr val="accent1"/>
+          </a:effectRef>
+          <a:fontRef idx="minor">
+            <a:schemeClr val="lt1"/>
+          </a:fontRef>
+        </p:style>
+        <p:txBody>
+          <a:bodyPr rtlCol="0" anchor="ctr"/>
+          <a:lstStyle/>
+          <a:p>
+            <a:pPr algn="ctr"/>
+            <a:r>
+              <a:rPr lang="en-US" dirty="0"/>
+              <a:t>Resource Providers</a:t>
+            </a:r>
+          </a:p>
+        </p:txBody>
+      </p:sp>
+      <p:sp>
+        <p:nvSpPr>
+          <p:cNvPr id="15" name="Rectangle 14">
+            <a:extLst>
+              <a:ext uri="{FF2B5EF4-FFF2-40B4-BE49-F238E27FC236}">
+                <a16:creationId xmlns:a16="http://schemas.microsoft.com/office/drawing/2014/main" id="{F2F322B5-BB53-754D-B5E2-276F236FE40C}"/>
+              </a:ext>
+            </a:extLst>
+          </p:cNvPr>
+          <p:cNvSpPr/>
+          <p:nvPr/>
+        </p:nvSpPr>
+        <p:spPr>
+          <a:xfrm>
+            <a:off x="1792651" y="5159950"/>
+            <a:ext cx="1227946" cy="749445"/>
+          </a:xfrm>
+          <a:prstGeom prst="rect">
+            <a:avLst/>
+          </a:prstGeom>
+          <a:noFill/>
+          <a:ln w="57150">
+            <a:solidFill>
+              <a:srgbClr val="00FFF8"/>
+            </a:solidFill>
+          </a:ln>
+        </p:spPr>
+        <p:style>
+          <a:lnRef idx="2">
+            <a:schemeClr val="accent1">
+              <a:shade val="50000"/>
+            </a:schemeClr>
+          </a:lnRef>
+          <a:fillRef idx="1">
+            <a:schemeClr val="accent1"/>
+          </a:fillRef>
+          <a:effectRef idx="0">
+            <a:schemeClr val="accent1"/>
+          </a:effectRef>
+          <a:fontRef idx="minor">
+            <a:schemeClr val="lt1"/>
+          </a:fontRef>
+        </p:style>
+        <p:txBody>
+          <a:bodyPr rtlCol="0" anchor="ctr"/>
+          <a:lstStyle/>
+          <a:p>
+            <a:pPr algn="ctr"/>
+            <a:r>
+              <a:rPr lang="en-US" dirty="0"/>
+              <a:t>Cosmos</a:t>
+            </a:r>
+          </a:p>
+        </p:txBody>
+      </p:sp>
+      <p:sp>
+        <p:nvSpPr>
+          <p:cNvPr id="17" name="Rectangle 16">
+            <a:extLst>
+              <a:ext uri="{FF2B5EF4-FFF2-40B4-BE49-F238E27FC236}">
+                <a16:creationId xmlns:a16="http://schemas.microsoft.com/office/drawing/2014/main" id="{FC5B0875-BDB1-0E4B-AE69-338104792583}"/>
+              </a:ext>
+            </a:extLst>
+          </p:cNvPr>
+          <p:cNvSpPr/>
+          <p:nvPr/>
+        </p:nvSpPr>
+        <p:spPr>
+          <a:xfrm>
+            <a:off x="1419069" y="4788105"/>
+            <a:ext cx="7005404" cy="1387842"/>
+          </a:xfrm>
+          <a:prstGeom prst="rect">
+            <a:avLst/>
+          </a:prstGeom>
+          <a:noFill/>
+          <a:ln w="57150">
+            <a:solidFill>
+              <a:srgbClr val="00FFF8"/>
+            </a:solidFill>
+          </a:ln>
+        </p:spPr>
+        <p:style>
+          <a:lnRef idx="2">
+            <a:schemeClr val="accent1">
+              <a:shade val="50000"/>
+            </a:schemeClr>
+          </a:lnRef>
+          <a:fillRef idx="1">
+            <a:schemeClr val="accent1"/>
+          </a:fillRef>
+          <a:effectRef idx="0">
+            <a:schemeClr val="accent1"/>
+          </a:effectRef>
+          <a:fontRef idx="minor">
+            <a:schemeClr val="lt1"/>
+          </a:fontRef>
+        </p:style>
+        <p:txBody>
+          <a:bodyPr rtlCol="0" anchor="t"/>
+          <a:lstStyle/>
+          <a:p>
+            <a:pPr algn="ctr"/>
+            <a:r>
+              <a:rPr lang="en-US" dirty="0"/>
+              <a:t>Resources</a:t>
+            </a:r>
+          </a:p>
+        </p:txBody>
+      </p:sp>
+      <p:sp>
+        <p:nvSpPr>
+          <p:cNvPr id="20" name="Rectangle 19">
+            <a:extLst>
+              <a:ext uri="{FF2B5EF4-FFF2-40B4-BE49-F238E27FC236}">
+                <a16:creationId xmlns:a16="http://schemas.microsoft.com/office/drawing/2014/main" id="{0859BA15-FDF1-AD46-BEEA-76B53B1B682F}"/>
+              </a:ext>
+            </a:extLst>
+          </p:cNvPr>
+          <p:cNvSpPr/>
+          <p:nvPr/>
+        </p:nvSpPr>
+        <p:spPr>
+          <a:xfrm>
+            <a:off x="3367474" y="5201649"/>
+            <a:ext cx="1227946" cy="734455"/>
+          </a:xfrm>
+          <a:prstGeom prst="rect">
+            <a:avLst/>
+          </a:prstGeom>
+          <a:noFill/>
+          <a:ln w="57150">
+            <a:solidFill>
+              <a:srgbClr val="00FFF8"/>
+            </a:solidFill>
+          </a:ln>
+        </p:spPr>
+        <p:style>
+          <a:lnRef idx="2">
+            <a:schemeClr val="accent1">
+              <a:shade val="50000"/>
+            </a:schemeClr>
+          </a:lnRef>
+          <a:fillRef idx="1">
+            <a:schemeClr val="accent1"/>
+          </a:fillRef>
+          <a:effectRef idx="0">
+            <a:schemeClr val="accent1"/>
+          </a:effectRef>
+          <a:fontRef idx="minor">
+            <a:schemeClr val="lt1"/>
+          </a:fontRef>
+        </p:style>
+        <p:txBody>
+          <a:bodyPr rtlCol="0" anchor="ctr"/>
+          <a:lstStyle/>
+          <a:p>
+            <a:pPr algn="ctr"/>
+            <a:r>
+              <a:rPr lang="en-US" dirty="0"/>
+              <a:t>Storage</a:t>
+            </a:r>
+          </a:p>
+        </p:txBody>
+      </p:sp>
+      <p:sp>
+        <p:nvSpPr>
+          <p:cNvPr id="21" name="Rectangle 20">
+            <a:extLst>
+              <a:ext uri="{FF2B5EF4-FFF2-40B4-BE49-F238E27FC236}">
+                <a16:creationId xmlns:a16="http://schemas.microsoft.com/office/drawing/2014/main" id="{865AFCA4-D5B7-E648-8CC6-EE2C55258256}"/>
+              </a:ext>
+            </a:extLst>
+          </p:cNvPr>
+          <p:cNvSpPr/>
+          <p:nvPr/>
+        </p:nvSpPr>
+        <p:spPr>
+          <a:xfrm>
+            <a:off x="4996720" y="5206061"/>
+            <a:ext cx="1227946" cy="730043"/>
+          </a:xfrm>
+          <a:prstGeom prst="rect">
+            <a:avLst/>
+          </a:prstGeom>
+          <a:noFill/>
+          <a:ln w="57150">
+            <a:solidFill>
+              <a:srgbClr val="00FFF8"/>
+            </a:solidFill>
+          </a:ln>
+        </p:spPr>
+        <p:style>
+          <a:lnRef idx="2">
+            <a:schemeClr val="accent1">
+              <a:shade val="50000"/>
+            </a:schemeClr>
+          </a:lnRef>
+          <a:fillRef idx="1">
+            <a:schemeClr val="accent1"/>
+          </a:fillRef>
+          <a:effectRef idx="0">
+            <a:schemeClr val="accent1"/>
+          </a:effectRef>
+          <a:fontRef idx="minor">
+            <a:schemeClr val="lt1"/>
+          </a:fontRef>
+        </p:style>
+        <p:txBody>
+          <a:bodyPr rtlCol="0" anchor="ctr"/>
+          <a:lstStyle/>
+          <a:p>
+            <a:pPr algn="ctr"/>
+            <a:r>
+              <a:rPr lang="en-US" dirty="0"/>
+              <a:t>Key Vault</a:t>
+            </a:r>
+          </a:p>
+        </p:txBody>
+      </p:sp>
+      <p:sp>
+        <p:nvSpPr>
+          <p:cNvPr id="22" name="Rectangle 21">
+            <a:extLst>
+              <a:ext uri="{FF2B5EF4-FFF2-40B4-BE49-F238E27FC236}">
+                <a16:creationId xmlns:a16="http://schemas.microsoft.com/office/drawing/2014/main" id="{F875DAC4-8655-CC44-AF85-D3A434375F66}"/>
+              </a:ext>
+            </a:extLst>
+          </p:cNvPr>
+          <p:cNvSpPr/>
+          <p:nvPr/>
+        </p:nvSpPr>
+        <p:spPr>
+          <a:xfrm>
+            <a:off x="6599261" y="5143144"/>
+            <a:ext cx="1227946" cy="732999"/>
+          </a:xfrm>
+          <a:prstGeom prst="rect">
+            <a:avLst/>
+          </a:prstGeom>
+          <a:noFill/>
+          <a:ln w="57150">
+            <a:solidFill>
+              <a:srgbClr val="00FFF8"/>
+            </a:solidFill>
+          </a:ln>
+        </p:spPr>
+        <p:style>
+          <a:lnRef idx="2">
+            <a:schemeClr val="accent1">
+              <a:shade val="50000"/>
+            </a:schemeClr>
+          </a:lnRef>
+          <a:fillRef idx="1">
+            <a:schemeClr val="accent1"/>
+          </a:fillRef>
+          <a:effectRef idx="0">
+            <a:schemeClr val="accent1"/>
+          </a:effectRef>
+          <a:fontRef idx="minor">
+            <a:schemeClr val="lt1"/>
+          </a:fontRef>
+        </p:style>
+        <p:txBody>
+          <a:bodyPr rtlCol="0" anchor="ctr"/>
+          <a:lstStyle/>
+          <a:p>
+            <a:pPr algn="ctr"/>
+            <a:r>
+              <a:rPr lang="en-US" dirty="0"/>
+              <a:t>Web App</a:t>
+            </a:r>
+          </a:p>
+        </p:txBody>
+      </p:sp>
+      <p:sp>
+        <p:nvSpPr>
+          <p:cNvPr id="24" name="Rectangle 23">
+            <a:extLst>
+              <a:ext uri="{FF2B5EF4-FFF2-40B4-BE49-F238E27FC236}">
+                <a16:creationId xmlns:a16="http://schemas.microsoft.com/office/drawing/2014/main" id="{4877BC7B-5FE3-7745-BDC0-8ED59B67D323}"/>
+              </a:ext>
+            </a:extLst>
+          </p:cNvPr>
+          <p:cNvSpPr/>
+          <p:nvPr/>
+        </p:nvSpPr>
+        <p:spPr>
+          <a:xfrm>
+            <a:off x="402858" y="1337427"/>
+            <a:ext cx="9323882" cy="5318205"/>
+          </a:xfrm>
+          <a:prstGeom prst="rect">
+            <a:avLst/>
+          </a:prstGeom>
+          <a:noFill/>
+          <a:ln w="57150">
+            <a:solidFill>
+              <a:srgbClr val="00FFF8"/>
+            </a:solidFill>
+          </a:ln>
+        </p:spPr>
+        <p:style>
+          <a:lnRef idx="2">
+            <a:schemeClr val="accent1">
+              <a:shade val="50000"/>
+            </a:schemeClr>
+          </a:lnRef>
+          <a:fillRef idx="1">
+            <a:schemeClr val="accent1"/>
+          </a:fillRef>
+          <a:effectRef idx="0">
+            <a:schemeClr val="accent1"/>
+          </a:effectRef>
+          <a:fontRef idx="minor">
+            <a:schemeClr val="lt1"/>
+          </a:fontRef>
+        </p:style>
+        <p:txBody>
+          <a:bodyPr rtlCol="0" anchor="b"/>
+          <a:lstStyle/>
+          <a:p>
+            <a:pPr algn="ctr"/>
+            <a:r>
+              <a:rPr lang="en-US" sz="2400" dirty="0"/>
+              <a:t>Azure</a:t>
+            </a:r>
+          </a:p>
+        </p:txBody>
+      </p:sp>
+      <p:sp>
+        <p:nvSpPr>
+          <p:cNvPr id="26" name="Rectangle 25">
+            <a:extLst>
+              <a:ext uri="{FF2B5EF4-FFF2-40B4-BE49-F238E27FC236}">
+                <a16:creationId xmlns:a16="http://schemas.microsoft.com/office/drawing/2014/main" id="{21B3BEE5-22D9-4A47-8244-35D003D05BFF}"/>
+              </a:ext>
+            </a:extLst>
+          </p:cNvPr>
+          <p:cNvSpPr/>
+          <p:nvPr/>
+        </p:nvSpPr>
+        <p:spPr>
+          <a:xfrm>
+            <a:off x="1508454" y="2856688"/>
+            <a:ext cx="2295994" cy="449705"/>
+          </a:xfrm>
+          <a:prstGeom prst="rect">
+            <a:avLst/>
+          </a:prstGeom>
+          <a:noFill/>
+          <a:ln w="57150">
+            <a:solidFill>
+              <a:srgbClr val="00FFF8"/>
+            </a:solidFill>
+          </a:ln>
+        </p:spPr>
+        <p:style>
+          <a:lnRef idx="2">
+            <a:schemeClr val="accent1">
+              <a:shade val="50000"/>
+            </a:schemeClr>
+          </a:lnRef>
+          <a:fillRef idx="1">
+            <a:schemeClr val="accent1"/>
+          </a:fillRef>
+          <a:effectRef idx="0">
+            <a:schemeClr val="accent1"/>
+          </a:effectRef>
+          <a:fontRef idx="minor">
+            <a:schemeClr val="lt1"/>
+          </a:fontRef>
+        </p:style>
+        <p:txBody>
+          <a:bodyPr rtlCol="0" anchor="ctr"/>
+          <a:lstStyle/>
+          <a:p>
+            <a:pPr algn="ctr"/>
+            <a:r>
+              <a:rPr lang="en-US" dirty="0"/>
+              <a:t>schemas</a:t>
+            </a:r>
+          </a:p>
+        </p:txBody>
+      </p:sp>
       <p:cxnSp>
         <p:nvCxnSpPr>
-          <p:cNvPr id="8" name="Straight Arrow Connector 7">
-            <a:extLst>
-              <a:ext uri="{FF2B5EF4-FFF2-40B4-BE49-F238E27FC236}">
-                <a16:creationId xmlns:a16="http://schemas.microsoft.com/office/drawing/2014/main" id="{11406191-710F-0C42-8AF3-45057B25256A}"/>
-              </a:ext>
-            </a:extLst>
-          </p:cNvPr>
-          <p:cNvCxnSpPr/>
+          <p:cNvPr id="28" name="Straight Arrow Connector 27">
+            <a:extLst>
+              <a:ext uri="{FF2B5EF4-FFF2-40B4-BE49-F238E27FC236}">
+                <a16:creationId xmlns:a16="http://schemas.microsoft.com/office/drawing/2014/main" id="{761335D9-415F-E747-AF40-C479540B91EC}"/>
+              </a:ext>
+            </a:extLst>
+          </p:cNvPr>
+          <p:cNvCxnSpPr>
+            <a:cxnSpLocks/>
+            <a:stCxn id="5" idx="2"/>
+          </p:cNvCxnSpPr>
           <p:nvPr/>
         </p:nvCxnSpPr>
         <p:spPr>
           <a:xfrm>
-            <a:off x="849086" y="2286000"/>
-            <a:ext cx="1404257" cy="0"/>
+            <a:off x="2934324" y="2039781"/>
+            <a:ext cx="0" cy="523463"/>
           </a:xfrm>
           <a:prstGeom prst="straightConnector1">
             <a:avLst/>
           </a:prstGeom>
-          <a:ln w="76200">
+          <a:ln w="38100">
             <a:solidFill>
-              <a:srgbClr val="FF0000"/>
+              <a:srgbClr val="00FFF8"/>
             </a:solidFill>
-            <a:tailEnd type="triangle"/>
+            <a:tailEnd type="arrow"/>
           </a:ln>
         </p:spPr>
         <p:style>
@@ -19383,29 +20291,32 @@
       </p:cxnSp>
       <p:cxnSp>
         <p:nvCxnSpPr>
-          <p:cNvPr id="9" name="Straight Arrow Connector 8">
-            <a:extLst>
-              <a:ext uri="{FF2B5EF4-FFF2-40B4-BE49-F238E27FC236}">
-                <a16:creationId xmlns:a16="http://schemas.microsoft.com/office/drawing/2014/main" id="{7339FBAF-4D8B-0448-9665-78D760AAFB58}"/>
-              </a:ext>
-            </a:extLst>
-          </p:cNvPr>
-          <p:cNvCxnSpPr/>
+          <p:cNvPr id="29" name="Straight Arrow Connector 28">
+            <a:extLst>
+              <a:ext uri="{FF2B5EF4-FFF2-40B4-BE49-F238E27FC236}">
+                <a16:creationId xmlns:a16="http://schemas.microsoft.com/office/drawing/2014/main" id="{9C02BA2D-CFDA-8745-A434-1D550140EEAF}"/>
+              </a:ext>
+            </a:extLst>
+          </p:cNvPr>
+          <p:cNvCxnSpPr>
+            <a:cxnSpLocks/>
+            <a:stCxn id="6" idx="2"/>
+          </p:cNvCxnSpPr>
           <p:nvPr/>
         </p:nvCxnSpPr>
         <p:spPr>
           <a:xfrm>
-            <a:off x="849086" y="2786742"/>
-            <a:ext cx="1404257" cy="0"/>
+            <a:off x="6451698" y="2031307"/>
+            <a:ext cx="0" cy="531937"/>
           </a:xfrm>
           <a:prstGeom prst="straightConnector1">
             <a:avLst/>
           </a:prstGeom>
-          <a:ln w="76200">
+          <a:ln w="38100">
             <a:solidFill>
-              <a:srgbClr val="FF0000"/>
+              <a:srgbClr val="00FFF8"/>
             </a:solidFill>
-            <a:tailEnd type="triangle"/>
+            <a:tailEnd type="arrow"/>
           </a:ln>
         </p:spPr>
         <p:style>
@@ -19425,29 +20336,32 @@
       </p:cxnSp>
       <p:cxnSp>
         <p:nvCxnSpPr>
-          <p:cNvPr id="10" name="Straight Arrow Connector 9">
-            <a:extLst>
-              <a:ext uri="{FF2B5EF4-FFF2-40B4-BE49-F238E27FC236}">
-                <a16:creationId xmlns:a16="http://schemas.microsoft.com/office/drawing/2014/main" id="{1874C2CE-DB14-D54B-BE32-B28A8E8074FC}"/>
-              </a:ext>
-            </a:extLst>
-          </p:cNvPr>
-          <p:cNvCxnSpPr/>
+          <p:cNvPr id="33" name="Straight Arrow Connector 32">
+            <a:extLst>
+              <a:ext uri="{FF2B5EF4-FFF2-40B4-BE49-F238E27FC236}">
+                <a16:creationId xmlns:a16="http://schemas.microsoft.com/office/drawing/2014/main" id="{E4A304D5-2E64-BA42-AF9C-1ABC56512F15}"/>
+              </a:ext>
+            </a:extLst>
+          </p:cNvPr>
+          <p:cNvCxnSpPr>
+            <a:cxnSpLocks/>
+          </p:cNvCxnSpPr>
           <p:nvPr/>
         </p:nvCxnSpPr>
         <p:spPr>
           <a:xfrm>
-            <a:off x="758577" y="5355770"/>
-            <a:ext cx="1404257" cy="0"/>
+            <a:off x="4780613" y="3537679"/>
+            <a:ext cx="0" cy="355659"/>
           </a:xfrm>
           <a:prstGeom prst="straightConnector1">
             <a:avLst/>
           </a:prstGeom>
-          <a:ln w="76200">
+          <a:ln w="38100">
             <a:solidFill>
-              <a:srgbClr val="FF0000"/>
+              <a:srgbClr val="00FFF8"/>
             </a:solidFill>
-            <a:tailEnd type="triangle"/>
+            <a:headEnd type="none"/>
+            <a:tailEnd type="arrow"/>
           </a:ln>
         </p:spPr>
         <p:style>
@@ -19465,6 +20379,146 @@
           </a:fontRef>
         </p:style>
       </p:cxnSp>
+      <p:cxnSp>
+        <p:nvCxnSpPr>
+          <p:cNvPr id="35" name="Straight Arrow Connector 34">
+            <a:extLst>
+              <a:ext uri="{FF2B5EF4-FFF2-40B4-BE49-F238E27FC236}">
+                <a16:creationId xmlns:a16="http://schemas.microsoft.com/office/drawing/2014/main" id="{4D1332FB-8BE0-4444-9232-E41ECCC12F5C}"/>
+              </a:ext>
+            </a:extLst>
+          </p:cNvPr>
+          <p:cNvCxnSpPr>
+            <a:cxnSpLocks/>
+          </p:cNvCxnSpPr>
+          <p:nvPr/>
+        </p:nvCxnSpPr>
+        <p:spPr>
+          <a:xfrm>
+            <a:off x="4780613" y="4342345"/>
+            <a:ext cx="0" cy="445760"/>
+          </a:xfrm>
+          <a:prstGeom prst="straightConnector1">
+            <a:avLst/>
+          </a:prstGeom>
+          <a:ln w="38100">
+            <a:solidFill>
+              <a:srgbClr val="00FFF8"/>
+            </a:solidFill>
+            <a:tailEnd type="arrow"/>
+          </a:ln>
+        </p:spPr>
+        <p:style>
+          <a:lnRef idx="1">
+            <a:schemeClr val="accent1"/>
+          </a:lnRef>
+          <a:fillRef idx="0">
+            <a:schemeClr val="accent1"/>
+          </a:fillRef>
+          <a:effectRef idx="0">
+            <a:schemeClr val="accent1"/>
+          </a:effectRef>
+          <a:fontRef idx="minor">
+            <a:schemeClr val="tx1"/>
+          </a:fontRef>
+        </p:style>
+      </p:cxnSp>
+      <p:sp>
+        <p:nvSpPr>
+          <p:cNvPr id="37" name="Rectangle 36">
+            <a:extLst>
+              <a:ext uri="{FF2B5EF4-FFF2-40B4-BE49-F238E27FC236}">
+                <a16:creationId xmlns:a16="http://schemas.microsoft.com/office/drawing/2014/main" id="{315AF319-651E-234B-AE4C-E6568EAB144C}"/>
+              </a:ext>
+            </a:extLst>
+          </p:cNvPr>
+          <p:cNvSpPr/>
+          <p:nvPr/>
+        </p:nvSpPr>
+        <p:spPr>
+          <a:xfrm>
+            <a:off x="6871696" y="1915931"/>
+            <a:ext cx="2190985" cy="646331"/>
+          </a:xfrm>
+          <a:prstGeom prst="rect">
+            <a:avLst/>
+          </a:prstGeom>
+          <a:noFill/>
+        </p:spPr>
+        <p:txBody>
+          <a:bodyPr wrap="none" lIns="91440" tIns="45720" rIns="91440" bIns="45720">
+            <a:spAutoFit/>
+          </a:bodyPr>
+          <a:lstStyle/>
+          <a:p>
+            <a:pPr algn="ctr"/>
+            <a:r>
+              <a:rPr lang="en-US" sz="3600" b="0" cap="none" spc="0" dirty="0">
+                <a:ln w="0"/>
+                <a:solidFill>
+                  <a:srgbClr val="FF0000"/>
+                </a:solidFill>
+                <a:effectLst>
+                  <a:outerShdw blurRad="38100" dist="19050" dir="2700000" algn="tl" rotWithShape="0">
+                    <a:schemeClr val="dk1">
+                      <a:alpha val="40000"/>
+                    </a:schemeClr>
+                  </a:outerShdw>
+                </a:effectLst>
+              </a:rPr>
+              <a:t>imperative</a:t>
+            </a:r>
+          </a:p>
+        </p:txBody>
+      </p:sp>
+      <p:sp>
+        <p:nvSpPr>
+          <p:cNvPr id="38" name="Rectangle 37">
+            <a:extLst>
+              <a:ext uri="{FF2B5EF4-FFF2-40B4-BE49-F238E27FC236}">
+                <a16:creationId xmlns:a16="http://schemas.microsoft.com/office/drawing/2014/main" id="{A23450C2-E19A-AD4E-8370-41B4B035C3B5}"/>
+              </a:ext>
+            </a:extLst>
+          </p:cNvPr>
+          <p:cNvSpPr/>
+          <p:nvPr/>
+        </p:nvSpPr>
+        <p:spPr>
+          <a:xfrm>
+            <a:off x="470711" y="1886529"/>
+            <a:ext cx="2239074" cy="646331"/>
+          </a:xfrm>
+          <a:prstGeom prst="rect">
+            <a:avLst/>
+          </a:prstGeom>
+          <a:noFill/>
+        </p:spPr>
+        <p:txBody>
+          <a:bodyPr wrap="none" lIns="91440" tIns="45720" rIns="91440" bIns="45720">
+            <a:spAutoFit/>
+          </a:bodyPr>
+          <a:lstStyle/>
+          <a:p>
+            <a:pPr algn="ctr"/>
+            <a:r>
+              <a:rPr lang="en-US" sz="3600" b="0" cap="none" spc="0" dirty="0">
+                <a:ln w="0"/>
+                <a:solidFill>
+                  <a:srgbClr val="FF0000"/>
+                </a:solidFill>
+                <a:effectLst>
+                  <a:outerShdw blurRad="38100" dist="19050" dir="2700000" algn="tl" rotWithShape="0">
+                    <a:schemeClr val="dk1">
+                      <a:alpha val="40000"/>
+                    </a:schemeClr>
+                  </a:outerShdw>
+                </a:effectLst>
+              </a:rPr>
+              <a:t>declarative</a:t>
+            </a:r>
+          </a:p>
+        </p:txBody>
+      </p:sp>
     </p:spTree>
     <p:extLst>
       <p:ext uri="{BB962C8B-B14F-4D97-AF65-F5344CB8AC3E}">
@@ -19475,171 +20529,6 @@
   <p:clrMapOvr>
     <a:masterClrMapping/>
   </p:clrMapOvr>
-  <p:timing>
-    <p:tnLst>
-      <p:par>
-        <p:cTn id="1" dur="indefinite" restart="never" nodeType="tmRoot">
-          <p:childTnLst>
-            <p:seq concurrent="1" nextAc="seek">
-              <p:cTn id="2" dur="indefinite" nodeType="mainSeq">
-                <p:childTnLst>
-                  <p:par>
-                    <p:cTn id="3" fill="hold">
-                      <p:stCondLst>
-                        <p:cond delay="indefinite"/>
-                      </p:stCondLst>
-                      <p:childTnLst>
-                        <p:par>
-                          <p:cTn id="4" fill="hold">
-                            <p:stCondLst>
-                              <p:cond delay="0"/>
-                            </p:stCondLst>
-                            <p:childTnLst>
-                              <p:par>
-                                <p:cTn id="5" presetID="1" presetClass="entr" presetSubtype="0" fill="hold" nodeType="clickEffect">
-                                  <p:stCondLst>
-                                    <p:cond delay="0"/>
-                                  </p:stCondLst>
-                                  <p:childTnLst>
-                                    <p:set>
-                                      <p:cBhvr>
-                                        <p:cTn id="6" dur="1" fill="hold">
-                                          <p:stCondLst>
-                                            <p:cond delay="0"/>
-                                          </p:stCondLst>
-                                        </p:cTn>
-                                        <p:tgtEl>
-                                          <p:spTgt spid="9"/>
-                                        </p:tgtEl>
-                                        <p:attrNameLst>
-                                          <p:attrName>style.visibility</p:attrName>
-                                        </p:attrNameLst>
-                                      </p:cBhvr>
-                                      <p:to>
-                                        <p:strVal val="visible"/>
-                                      </p:to>
-                                    </p:set>
-                                  </p:childTnLst>
-                                </p:cTn>
-                              </p:par>
-                            </p:childTnLst>
-                          </p:cTn>
-                        </p:par>
-                      </p:childTnLst>
-                    </p:cTn>
-                  </p:par>
-                  <p:par>
-                    <p:cTn id="7" fill="hold">
-                      <p:stCondLst>
-                        <p:cond delay="indefinite"/>
-                      </p:stCondLst>
-                      <p:childTnLst>
-                        <p:par>
-                          <p:cTn id="8" fill="hold">
-                            <p:stCondLst>
-                              <p:cond delay="0"/>
-                            </p:stCondLst>
-                            <p:childTnLst>
-                              <p:par>
-                                <p:cTn id="9" presetID="1" presetClass="entr" presetSubtype="0" fill="hold" nodeType="clickEffect">
-                                  <p:stCondLst>
-                                    <p:cond delay="0"/>
-                                  </p:stCondLst>
-                                  <p:childTnLst>
-                                    <p:set>
-                                      <p:cBhvr>
-                                        <p:cTn id="10" dur="1" fill="hold">
-                                          <p:stCondLst>
-                                            <p:cond delay="0"/>
-                                          </p:stCondLst>
-                                        </p:cTn>
-                                        <p:tgtEl>
-                                          <p:spTgt spid="10"/>
-                                        </p:tgtEl>
-                                        <p:attrNameLst>
-                                          <p:attrName>style.visibility</p:attrName>
-                                        </p:attrNameLst>
-                                      </p:cBhvr>
-                                      <p:to>
-                                        <p:strVal val="visible"/>
-                                      </p:to>
-                                    </p:set>
-                                  </p:childTnLst>
-                                </p:cTn>
-                              </p:par>
-                            </p:childTnLst>
-                          </p:cTn>
-                        </p:par>
-                      </p:childTnLst>
-                    </p:cTn>
-                  </p:par>
-                  <p:par>
-                    <p:cTn id="11" fill="hold">
-                      <p:stCondLst>
-                        <p:cond delay="indefinite"/>
-                      </p:stCondLst>
-                      <p:childTnLst>
-                        <p:par>
-                          <p:cTn id="12" fill="hold">
-                            <p:stCondLst>
-                              <p:cond delay="0"/>
-                            </p:stCondLst>
-                            <p:childTnLst>
-                              <p:par>
-                                <p:cTn id="13" presetID="1" presetClass="entr" presetSubtype="0" fill="hold" nodeType="clickEffect">
-                                  <p:stCondLst>
-                                    <p:cond delay="0"/>
-                                  </p:stCondLst>
-                                  <p:childTnLst>
-                                    <p:set>
-                                      <p:cBhvr>
-                                        <p:cTn id="14" dur="1" fill="hold">
-                                          <p:stCondLst>
-                                            <p:cond delay="0"/>
-                                          </p:stCondLst>
-                                        </p:cTn>
-                                        <p:tgtEl>
-                                          <p:spTgt spid="8"/>
-                                        </p:tgtEl>
-                                        <p:attrNameLst>
-                                          <p:attrName>style.visibility</p:attrName>
-                                        </p:attrNameLst>
-                                      </p:cBhvr>
-                                      <p:to>
-                                        <p:strVal val="visible"/>
-                                      </p:to>
-                                    </p:set>
-                                  </p:childTnLst>
-                                </p:cTn>
-                              </p:par>
-                            </p:childTnLst>
-                          </p:cTn>
-                        </p:par>
-                      </p:childTnLst>
-                    </p:cTn>
-                  </p:par>
-                </p:childTnLst>
-              </p:cTn>
-              <p:prevCondLst>
-                <p:cond evt="onPrev" delay="0">
-                  <p:tgtEl>
-                    <p:sldTgt/>
-                  </p:tgtEl>
-                </p:cond>
-              </p:prevCondLst>
-              <p:nextCondLst>
-                <p:cond evt="onNext" delay="0">
-                  <p:tgtEl>
-                    <p:sldTgt/>
-                  </p:tgtEl>
-                </p:cond>
-              </p:nextCondLst>
-            </p:seq>
-          </p:childTnLst>
-        </p:cTn>
-      </p:par>
-    </p:tnLst>
-  </p:timing>
 </p:sld>
 </file>
 
@@ -20409,18 +21298,13 @@
           </a:p>
           <a:p>
             <a:r>
-              <a:rPr lang="en-US" dirty="0" err="1">
+              <a:rPr lang="en-US" dirty="0">
                 <a:solidFill>
                   <a:schemeClr val="bg1"/>
                 </a:solidFill>
               </a:rPr>
-              <a:t>idemponent</a:t>
-            </a:r>
-            <a:endParaRPr lang="en-US" dirty="0">
-              <a:solidFill>
-                <a:schemeClr val="bg1"/>
-              </a:solidFill>
-            </a:endParaRPr>
+              <a:t>idempotent</a:t>
+            </a:r>
           </a:p>
         </p:txBody>
       </p:sp>

</xml_diff>

<commit_message>
powershell create resource group creation typo
</commit_message>
<xml_diff>
--- a/ARM Brown Bag.pptx
+++ b/ARM Brown Bag.pptx
@@ -13769,7 +13769,7 @@
                   <a:schemeClr val="bg1"/>
                 </a:solidFill>
               </a:rPr>
-              <a:t>ExampleResourceGroup</a:t>
+              <a:t>ExampleGroup</a:t>
             </a:r>
             <a:r>
               <a:rPr lang="en-US" dirty="0">
@@ -14197,7 +14197,7 @@
                                         <p:tgtEl>
                                           <p:spTgt spid="6">
                                             <p:txEl>
-                                              <p:charRg st="176" end="213"/>
+                                              <p:pRg st="6" end="6"/>
                                             </p:txEl>
                                           </p:spTgt>
                                         </p:tgtEl>
@@ -14228,7 +14228,7 @@
                                         <p:tgtEl>
                                           <p:spTgt spid="6">
                                             <p:txEl>
-                                              <p:charRg st="213" end="239"/>
+                                              <p:pRg st="7" end="7"/>
                                             </p:txEl>
                                           </p:spTgt>
                                         </p:tgtEl>
@@ -14259,7 +14259,7 @@
                                         <p:tgtEl>
                                           <p:spTgt spid="6">
                                             <p:txEl>
-                                              <p:charRg st="239" end="273"/>
+                                              <p:pRg st="8" end="8"/>
                                             </p:txEl>
                                           </p:spTgt>
                                         </p:tgtEl>
@@ -14290,7 +14290,7 @@
                                         <p:tgtEl>
                                           <p:spTgt spid="6">
                                             <p:txEl>
-                                              <p:charRg st="273" end="303"/>
+                                              <p:pRg st="9" end="9"/>
                                             </p:txEl>
                                           </p:spTgt>
                                         </p:tgtEl>
@@ -14321,7 +14321,7 @@
                                         <p:tgtEl>
                                           <p:spTgt spid="6">
                                             <p:txEl>
-                                              <p:charRg st="303" end="345"/>
+                                              <p:pRg st="10" end="10"/>
                                             </p:txEl>
                                           </p:spTgt>
                                         </p:tgtEl>
@@ -14352,7 +14352,7 @@
                                         <p:tgtEl>
                                           <p:spTgt spid="6">
                                             <p:txEl>
-                                              <p:charRg st="345" end="362"/>
+                                              <p:pRg st="11" end="11"/>
                                             </p:txEl>
                                           </p:spTgt>
                                         </p:tgtEl>
@@ -14383,7 +14383,7 @@
                                         <p:tgtEl>
                                           <p:spTgt spid="6">
                                             <p:txEl>
-                                              <p:charRg st="362" end="371"/>
+                                              <p:pRg st="12" end="12"/>
                                             </p:txEl>
                                           </p:spTgt>
                                         </p:tgtEl>
@@ -14414,7 +14414,7 @@
                                         <p:tgtEl>
                                           <p:spTgt spid="6">
                                             <p:txEl>
-                                              <p:charRg st="371" end="380"/>
+                                              <p:pRg st="13" end="13"/>
                                             </p:txEl>
                                           </p:spTgt>
                                         </p:tgtEl>
@@ -20437,7 +20437,7 @@
         </p:nvSpPr>
         <p:spPr>
           <a:xfrm>
-            <a:off x="6871696" y="1915931"/>
+            <a:off x="400084" y="1944388"/>
             <a:ext cx="2190985" cy="646331"/>
           </a:xfrm>
           <a:prstGeom prst="rect">
@@ -20485,7 +20485,7 @@
         </p:nvSpPr>
         <p:spPr>
           <a:xfrm>
-            <a:off x="470711" y="1886529"/>
+            <a:off x="7146870" y="1950826"/>
             <a:ext cx="2239074" cy="646331"/>
           </a:xfrm>
           <a:prstGeom prst="rect">
@@ -20519,6 +20519,409 @@
           </a:p>
         </p:txBody>
       </p:sp>
+      <p:sp>
+        <p:nvSpPr>
+          <p:cNvPr id="39" name="Snip and Round Single Corner Rectangle 38">
+            <a:extLst>
+              <a:ext uri="{FF2B5EF4-FFF2-40B4-BE49-F238E27FC236}">
+                <a16:creationId xmlns:a16="http://schemas.microsoft.com/office/drawing/2014/main" id="{1DB343A5-B055-6845-9D1C-C986701A5543}"/>
+              </a:ext>
+            </a:extLst>
+          </p:cNvPr>
+          <p:cNvSpPr/>
+          <p:nvPr/>
+        </p:nvSpPr>
+        <p:spPr>
+          <a:xfrm>
+            <a:off x="7038300" y="195103"/>
+            <a:ext cx="1294422" cy="853072"/>
+          </a:xfrm>
+          <a:prstGeom prst="snipRoundRect">
+            <a:avLst/>
+          </a:prstGeom>
+        </p:spPr>
+        <p:style>
+          <a:lnRef idx="2">
+            <a:schemeClr val="accent1">
+              <a:shade val="50000"/>
+            </a:schemeClr>
+          </a:lnRef>
+          <a:fillRef idx="1">
+            <a:schemeClr val="accent1"/>
+          </a:fillRef>
+          <a:effectRef idx="0">
+            <a:schemeClr val="accent1"/>
+          </a:effectRef>
+          <a:fontRef idx="minor">
+            <a:schemeClr val="lt1"/>
+          </a:fontRef>
+        </p:style>
+        <p:txBody>
+          <a:bodyPr rtlCol="0" anchor="ctr"/>
+          <a:lstStyle/>
+          <a:p>
+            <a:pPr algn="ctr"/>
+            <a:r>
+              <a:rPr lang="en-US" dirty="0"/>
+              <a:t>template</a:t>
+            </a:r>
+          </a:p>
+        </p:txBody>
+      </p:sp>
+      <p:cxnSp>
+        <p:nvCxnSpPr>
+          <p:cNvPr id="40" name="Straight Arrow Connector 39">
+            <a:extLst>
+              <a:ext uri="{FF2B5EF4-FFF2-40B4-BE49-F238E27FC236}">
+                <a16:creationId xmlns:a16="http://schemas.microsoft.com/office/drawing/2014/main" id="{6AB340DE-6C27-3D41-AFBB-E76CE4BBE01B}"/>
+              </a:ext>
+            </a:extLst>
+          </p:cNvPr>
+          <p:cNvCxnSpPr>
+            <a:cxnSpLocks/>
+            <a:endCxn id="6" idx="0"/>
+          </p:cNvCxnSpPr>
+          <p:nvPr/>
+        </p:nvCxnSpPr>
+        <p:spPr>
+          <a:xfrm flipH="1">
+            <a:off x="6451698" y="1034675"/>
+            <a:ext cx="1066800" cy="531937"/>
+          </a:xfrm>
+          <a:prstGeom prst="straightConnector1">
+            <a:avLst/>
+          </a:prstGeom>
+          <a:ln w="38100">
+            <a:solidFill>
+              <a:srgbClr val="FF7B00"/>
+            </a:solidFill>
+            <a:tailEnd type="arrow"/>
+          </a:ln>
+        </p:spPr>
+        <p:style>
+          <a:lnRef idx="1">
+            <a:schemeClr val="accent1"/>
+          </a:lnRef>
+          <a:fillRef idx="0">
+            <a:schemeClr val="accent1"/>
+          </a:fillRef>
+          <a:effectRef idx="0">
+            <a:schemeClr val="accent1"/>
+          </a:effectRef>
+          <a:fontRef idx="minor">
+            <a:schemeClr val="tx1"/>
+          </a:fontRef>
+        </p:style>
+      </p:cxnSp>
+      <p:cxnSp>
+        <p:nvCxnSpPr>
+          <p:cNvPr id="42" name="Straight Arrow Connector 41">
+            <a:extLst>
+              <a:ext uri="{FF2B5EF4-FFF2-40B4-BE49-F238E27FC236}">
+                <a16:creationId xmlns:a16="http://schemas.microsoft.com/office/drawing/2014/main" id="{3671AE7F-4A06-A44D-B77A-2244A89B1C00}"/>
+              </a:ext>
+            </a:extLst>
+          </p:cNvPr>
+          <p:cNvCxnSpPr>
+            <a:cxnSpLocks/>
+          </p:cNvCxnSpPr>
+          <p:nvPr/>
+        </p:nvCxnSpPr>
+        <p:spPr>
+          <a:xfrm>
+            <a:off x="5837420" y="2039781"/>
+            <a:ext cx="0" cy="551691"/>
+          </a:xfrm>
+          <a:prstGeom prst="straightConnector1">
+            <a:avLst/>
+          </a:prstGeom>
+          <a:ln w="38100">
+            <a:solidFill>
+              <a:srgbClr val="FF7B00"/>
+            </a:solidFill>
+            <a:tailEnd type="arrow"/>
+          </a:ln>
+        </p:spPr>
+        <p:style>
+          <a:lnRef idx="1">
+            <a:schemeClr val="accent1"/>
+          </a:lnRef>
+          <a:fillRef idx="0">
+            <a:schemeClr val="accent1"/>
+          </a:fillRef>
+          <a:effectRef idx="0">
+            <a:schemeClr val="accent1"/>
+          </a:effectRef>
+          <a:fontRef idx="minor">
+            <a:schemeClr val="tx1"/>
+          </a:fontRef>
+        </p:style>
+      </p:cxnSp>
+      <p:cxnSp>
+        <p:nvCxnSpPr>
+          <p:cNvPr id="44" name="Straight Arrow Connector 43">
+            <a:extLst>
+              <a:ext uri="{FF2B5EF4-FFF2-40B4-BE49-F238E27FC236}">
+                <a16:creationId xmlns:a16="http://schemas.microsoft.com/office/drawing/2014/main" id="{E5B7044A-28A4-344C-B057-EB3248A45864}"/>
+              </a:ext>
+            </a:extLst>
+          </p:cNvPr>
+          <p:cNvCxnSpPr>
+            <a:cxnSpLocks/>
+          </p:cNvCxnSpPr>
+          <p:nvPr/>
+        </p:nvCxnSpPr>
+        <p:spPr>
+          <a:xfrm>
+            <a:off x="2385388" y="3331434"/>
+            <a:ext cx="0" cy="551691"/>
+          </a:xfrm>
+          <a:prstGeom prst="straightConnector1">
+            <a:avLst/>
+          </a:prstGeom>
+          <a:ln w="38100">
+            <a:solidFill>
+              <a:srgbClr val="FF7B00"/>
+            </a:solidFill>
+            <a:tailEnd type="arrow"/>
+          </a:ln>
+        </p:spPr>
+        <p:style>
+          <a:lnRef idx="1">
+            <a:schemeClr val="accent1"/>
+          </a:lnRef>
+          <a:fillRef idx="0">
+            <a:schemeClr val="accent1"/>
+          </a:fillRef>
+          <a:effectRef idx="0">
+            <a:schemeClr val="accent1"/>
+          </a:effectRef>
+          <a:fontRef idx="minor">
+            <a:schemeClr val="tx1"/>
+          </a:fontRef>
+        </p:style>
+      </p:cxnSp>
+      <p:cxnSp>
+        <p:nvCxnSpPr>
+          <p:cNvPr id="45" name="Straight Arrow Connector 44">
+            <a:extLst>
+              <a:ext uri="{FF2B5EF4-FFF2-40B4-BE49-F238E27FC236}">
+                <a16:creationId xmlns:a16="http://schemas.microsoft.com/office/drawing/2014/main" id="{BD9A5DE2-1E91-EE4D-94DF-8A13B7309455}"/>
+              </a:ext>
+            </a:extLst>
+          </p:cNvPr>
+          <p:cNvCxnSpPr>
+            <a:cxnSpLocks/>
+          </p:cNvCxnSpPr>
+          <p:nvPr/>
+        </p:nvCxnSpPr>
+        <p:spPr>
+          <a:xfrm>
+            <a:off x="2709785" y="3331433"/>
+            <a:ext cx="0" cy="551691"/>
+          </a:xfrm>
+          <a:prstGeom prst="straightConnector1">
+            <a:avLst/>
+          </a:prstGeom>
+          <a:ln w="38100">
+            <a:solidFill>
+              <a:srgbClr val="FF7B00"/>
+            </a:solidFill>
+            <a:tailEnd type="arrow"/>
+          </a:ln>
+        </p:spPr>
+        <p:style>
+          <a:lnRef idx="1">
+            <a:schemeClr val="accent1"/>
+          </a:lnRef>
+          <a:fillRef idx="0">
+            <a:schemeClr val="accent1"/>
+          </a:fillRef>
+          <a:effectRef idx="0">
+            <a:schemeClr val="accent1"/>
+          </a:effectRef>
+          <a:fontRef idx="minor">
+            <a:schemeClr val="tx1"/>
+          </a:fontRef>
+        </p:style>
+      </p:cxnSp>
+      <p:cxnSp>
+        <p:nvCxnSpPr>
+          <p:cNvPr id="46" name="Straight Arrow Connector 45">
+            <a:extLst>
+              <a:ext uri="{FF2B5EF4-FFF2-40B4-BE49-F238E27FC236}">
+                <a16:creationId xmlns:a16="http://schemas.microsoft.com/office/drawing/2014/main" id="{98D1A406-2DFC-F04F-AA95-98166EEBD3F0}"/>
+              </a:ext>
+            </a:extLst>
+          </p:cNvPr>
+          <p:cNvCxnSpPr>
+            <a:cxnSpLocks/>
+          </p:cNvCxnSpPr>
+          <p:nvPr/>
+        </p:nvCxnSpPr>
+        <p:spPr>
+          <a:xfrm>
+            <a:off x="3020597" y="3306393"/>
+            <a:ext cx="0" cy="551691"/>
+          </a:xfrm>
+          <a:prstGeom prst="straightConnector1">
+            <a:avLst/>
+          </a:prstGeom>
+          <a:ln w="38100">
+            <a:solidFill>
+              <a:srgbClr val="FF7B00"/>
+            </a:solidFill>
+            <a:tailEnd type="arrow"/>
+          </a:ln>
+        </p:spPr>
+        <p:style>
+          <a:lnRef idx="1">
+            <a:schemeClr val="accent1"/>
+          </a:lnRef>
+          <a:fillRef idx="0">
+            <a:schemeClr val="accent1"/>
+          </a:fillRef>
+          <a:effectRef idx="0">
+            <a:schemeClr val="accent1"/>
+          </a:effectRef>
+          <a:fontRef idx="minor">
+            <a:schemeClr val="tx1"/>
+          </a:fontRef>
+        </p:style>
+      </p:cxnSp>
+      <p:cxnSp>
+        <p:nvCxnSpPr>
+          <p:cNvPr id="47" name="Straight Arrow Connector 46">
+            <a:extLst>
+              <a:ext uri="{FF2B5EF4-FFF2-40B4-BE49-F238E27FC236}">
+                <a16:creationId xmlns:a16="http://schemas.microsoft.com/office/drawing/2014/main" id="{95E397A1-BB54-EA46-88F8-BD86E150EC0A}"/>
+              </a:ext>
+            </a:extLst>
+          </p:cNvPr>
+          <p:cNvCxnSpPr>
+            <a:cxnSpLocks/>
+            <a:endCxn id="15" idx="0"/>
+          </p:cNvCxnSpPr>
+          <p:nvPr/>
+        </p:nvCxnSpPr>
+        <p:spPr>
+          <a:xfrm>
+            <a:off x="2406624" y="4342345"/>
+            <a:ext cx="0" cy="817605"/>
+          </a:xfrm>
+          <a:prstGeom prst="straightConnector1">
+            <a:avLst/>
+          </a:prstGeom>
+          <a:ln w="38100">
+            <a:solidFill>
+              <a:srgbClr val="FF7B00"/>
+            </a:solidFill>
+            <a:tailEnd type="arrow"/>
+          </a:ln>
+        </p:spPr>
+        <p:style>
+          <a:lnRef idx="1">
+            <a:schemeClr val="accent1"/>
+          </a:lnRef>
+          <a:fillRef idx="0">
+            <a:schemeClr val="accent1"/>
+          </a:fillRef>
+          <a:effectRef idx="0">
+            <a:schemeClr val="accent1"/>
+          </a:effectRef>
+          <a:fontRef idx="minor">
+            <a:schemeClr val="tx1"/>
+          </a:fontRef>
+        </p:style>
+      </p:cxnSp>
+      <p:cxnSp>
+        <p:nvCxnSpPr>
+          <p:cNvPr id="49" name="Straight Arrow Connector 48">
+            <a:extLst>
+              <a:ext uri="{FF2B5EF4-FFF2-40B4-BE49-F238E27FC236}">
+                <a16:creationId xmlns:a16="http://schemas.microsoft.com/office/drawing/2014/main" id="{8052AF98-C5C1-9041-B939-19A4D6E728D2}"/>
+              </a:ext>
+            </a:extLst>
+          </p:cNvPr>
+          <p:cNvCxnSpPr>
+            <a:cxnSpLocks/>
+          </p:cNvCxnSpPr>
+          <p:nvPr/>
+        </p:nvCxnSpPr>
+        <p:spPr>
+          <a:xfrm>
+            <a:off x="3788522" y="4346488"/>
+            <a:ext cx="0" cy="796656"/>
+          </a:xfrm>
+          <a:prstGeom prst="straightConnector1">
+            <a:avLst/>
+          </a:prstGeom>
+          <a:ln w="38100">
+            <a:solidFill>
+              <a:srgbClr val="FF7B00"/>
+            </a:solidFill>
+            <a:tailEnd type="arrow"/>
+          </a:ln>
+        </p:spPr>
+        <p:style>
+          <a:lnRef idx="1">
+            <a:schemeClr val="accent1"/>
+          </a:lnRef>
+          <a:fillRef idx="0">
+            <a:schemeClr val="accent1"/>
+          </a:fillRef>
+          <a:effectRef idx="0">
+            <a:schemeClr val="accent1"/>
+          </a:effectRef>
+          <a:fontRef idx="minor">
+            <a:schemeClr val="tx1"/>
+          </a:fontRef>
+        </p:style>
+      </p:cxnSp>
+      <p:cxnSp>
+        <p:nvCxnSpPr>
+          <p:cNvPr id="51" name="Straight Arrow Connector 50">
+            <a:extLst>
+              <a:ext uri="{FF2B5EF4-FFF2-40B4-BE49-F238E27FC236}">
+                <a16:creationId xmlns:a16="http://schemas.microsoft.com/office/drawing/2014/main" id="{4A11EF76-462A-1441-873F-FC0D65FB5576}"/>
+              </a:ext>
+            </a:extLst>
+          </p:cNvPr>
+          <p:cNvCxnSpPr>
+            <a:cxnSpLocks/>
+          </p:cNvCxnSpPr>
+          <p:nvPr/>
+        </p:nvCxnSpPr>
+        <p:spPr>
+          <a:xfrm>
+            <a:off x="5610693" y="4363294"/>
+            <a:ext cx="0" cy="796656"/>
+          </a:xfrm>
+          <a:prstGeom prst="straightConnector1">
+            <a:avLst/>
+          </a:prstGeom>
+          <a:ln w="38100">
+            <a:solidFill>
+              <a:srgbClr val="FF7B00"/>
+            </a:solidFill>
+            <a:tailEnd type="arrow"/>
+          </a:ln>
+        </p:spPr>
+        <p:style>
+          <a:lnRef idx="1">
+            <a:schemeClr val="accent1"/>
+          </a:lnRef>
+          <a:fillRef idx="0">
+            <a:schemeClr val="accent1"/>
+          </a:fillRef>
+          <a:effectRef idx="0">
+            <a:schemeClr val="accent1"/>
+          </a:effectRef>
+          <a:fontRef idx="minor">
+            <a:schemeClr val="tx1"/>
+          </a:fontRef>
+        </p:style>
+      </p:cxnSp>
     </p:spTree>
     <p:extLst>
       <p:ext uri="{BB962C8B-B14F-4D97-AF65-F5344CB8AC3E}">
@@ -20529,6 +20932,464 @@
   <p:clrMapOvr>
     <a:masterClrMapping/>
   </p:clrMapOvr>
+  <p:timing>
+    <p:tnLst>
+      <p:par>
+        <p:cTn id="1" dur="indefinite" restart="never" nodeType="tmRoot">
+          <p:childTnLst>
+            <p:seq concurrent="1" nextAc="seek">
+              <p:cTn id="2" dur="indefinite" nodeType="mainSeq">
+                <p:childTnLst>
+                  <p:par>
+                    <p:cTn id="3" fill="hold">
+                      <p:stCondLst>
+                        <p:cond delay="indefinite"/>
+                      </p:stCondLst>
+                      <p:childTnLst>
+                        <p:par>
+                          <p:cTn id="4" fill="hold">
+                            <p:stCondLst>
+                              <p:cond delay="0"/>
+                            </p:stCondLst>
+                            <p:childTnLst>
+                              <p:par>
+                                <p:cTn id="5" presetID="1" presetClass="entr" presetSubtype="0" fill="hold" grpId="0" nodeType="clickEffect">
+                                  <p:stCondLst>
+                                    <p:cond delay="0"/>
+                                  </p:stCondLst>
+                                  <p:childTnLst>
+                                    <p:set>
+                                      <p:cBhvr>
+                                        <p:cTn id="6" dur="1" fill="hold">
+                                          <p:stCondLst>
+                                            <p:cond delay="0"/>
+                                          </p:stCondLst>
+                                        </p:cTn>
+                                        <p:tgtEl>
+                                          <p:spTgt spid="37"/>
+                                        </p:tgtEl>
+                                        <p:attrNameLst>
+                                          <p:attrName>style.visibility</p:attrName>
+                                        </p:attrNameLst>
+                                      </p:cBhvr>
+                                      <p:to>
+                                        <p:strVal val="visible"/>
+                                      </p:to>
+                                    </p:set>
+                                  </p:childTnLst>
+                                </p:cTn>
+                              </p:par>
+                            </p:childTnLst>
+                          </p:cTn>
+                        </p:par>
+                      </p:childTnLst>
+                    </p:cTn>
+                  </p:par>
+                  <p:par>
+                    <p:cTn id="7" fill="hold">
+                      <p:stCondLst>
+                        <p:cond delay="indefinite"/>
+                      </p:stCondLst>
+                      <p:childTnLst>
+                        <p:par>
+                          <p:cTn id="8" fill="hold">
+                            <p:stCondLst>
+                              <p:cond delay="0"/>
+                            </p:stCondLst>
+                            <p:childTnLst>
+                              <p:par>
+                                <p:cTn id="9" presetID="1" presetClass="entr" presetSubtype="0" fill="hold" grpId="0" nodeType="clickEffect">
+                                  <p:stCondLst>
+                                    <p:cond delay="0"/>
+                                  </p:stCondLst>
+                                  <p:childTnLst>
+                                    <p:set>
+                                      <p:cBhvr>
+                                        <p:cTn id="10" dur="1" fill="hold">
+                                          <p:stCondLst>
+                                            <p:cond delay="0"/>
+                                          </p:stCondLst>
+                                        </p:cTn>
+                                        <p:tgtEl>
+                                          <p:spTgt spid="38"/>
+                                        </p:tgtEl>
+                                        <p:attrNameLst>
+                                          <p:attrName>style.visibility</p:attrName>
+                                        </p:attrNameLst>
+                                      </p:cBhvr>
+                                      <p:to>
+                                        <p:strVal val="visible"/>
+                                      </p:to>
+                                    </p:set>
+                                  </p:childTnLst>
+                                </p:cTn>
+                              </p:par>
+                            </p:childTnLst>
+                          </p:cTn>
+                        </p:par>
+                      </p:childTnLst>
+                    </p:cTn>
+                  </p:par>
+                  <p:par>
+                    <p:cTn id="11" fill="hold">
+                      <p:stCondLst>
+                        <p:cond delay="indefinite"/>
+                      </p:stCondLst>
+                      <p:childTnLst>
+                        <p:par>
+                          <p:cTn id="12" fill="hold">
+                            <p:stCondLst>
+                              <p:cond delay="0"/>
+                            </p:stCondLst>
+                            <p:childTnLst>
+                              <p:par>
+                                <p:cTn id="13" presetID="1" presetClass="entr" presetSubtype="0" fill="hold" grpId="0" nodeType="clickEffect">
+                                  <p:stCondLst>
+                                    <p:cond delay="0"/>
+                                  </p:stCondLst>
+                                  <p:childTnLst>
+                                    <p:set>
+                                      <p:cBhvr>
+                                        <p:cTn id="14" dur="1" fill="hold">
+                                          <p:stCondLst>
+                                            <p:cond delay="0"/>
+                                          </p:stCondLst>
+                                        </p:cTn>
+                                        <p:tgtEl>
+                                          <p:spTgt spid="39"/>
+                                        </p:tgtEl>
+                                        <p:attrNameLst>
+                                          <p:attrName>style.visibility</p:attrName>
+                                        </p:attrNameLst>
+                                      </p:cBhvr>
+                                      <p:to>
+                                        <p:strVal val="visible"/>
+                                      </p:to>
+                                    </p:set>
+                                  </p:childTnLst>
+                                </p:cTn>
+                              </p:par>
+                            </p:childTnLst>
+                          </p:cTn>
+                        </p:par>
+                      </p:childTnLst>
+                    </p:cTn>
+                  </p:par>
+                  <p:par>
+                    <p:cTn id="15" fill="hold">
+                      <p:stCondLst>
+                        <p:cond delay="indefinite"/>
+                      </p:stCondLst>
+                      <p:childTnLst>
+                        <p:par>
+                          <p:cTn id="16" fill="hold">
+                            <p:stCondLst>
+                              <p:cond delay="0"/>
+                            </p:stCondLst>
+                            <p:childTnLst>
+                              <p:par>
+                                <p:cTn id="17" presetID="1" presetClass="entr" presetSubtype="0" fill="hold" nodeType="clickEffect">
+                                  <p:stCondLst>
+                                    <p:cond delay="0"/>
+                                  </p:stCondLst>
+                                  <p:childTnLst>
+                                    <p:set>
+                                      <p:cBhvr>
+                                        <p:cTn id="18" dur="1" fill="hold">
+                                          <p:stCondLst>
+                                            <p:cond delay="0"/>
+                                          </p:stCondLst>
+                                        </p:cTn>
+                                        <p:tgtEl>
+                                          <p:spTgt spid="40"/>
+                                        </p:tgtEl>
+                                        <p:attrNameLst>
+                                          <p:attrName>style.visibility</p:attrName>
+                                        </p:attrNameLst>
+                                      </p:cBhvr>
+                                      <p:to>
+                                        <p:strVal val="visible"/>
+                                      </p:to>
+                                    </p:set>
+                                  </p:childTnLst>
+                                </p:cTn>
+                              </p:par>
+                            </p:childTnLst>
+                          </p:cTn>
+                        </p:par>
+                      </p:childTnLst>
+                    </p:cTn>
+                  </p:par>
+                  <p:par>
+                    <p:cTn id="19" fill="hold">
+                      <p:stCondLst>
+                        <p:cond delay="indefinite"/>
+                      </p:stCondLst>
+                      <p:childTnLst>
+                        <p:par>
+                          <p:cTn id="20" fill="hold">
+                            <p:stCondLst>
+                              <p:cond delay="0"/>
+                            </p:stCondLst>
+                            <p:childTnLst>
+                              <p:par>
+                                <p:cTn id="21" presetID="1" presetClass="entr" presetSubtype="0" fill="hold" nodeType="clickEffect">
+                                  <p:stCondLst>
+                                    <p:cond delay="0"/>
+                                  </p:stCondLst>
+                                  <p:childTnLst>
+                                    <p:set>
+                                      <p:cBhvr>
+                                        <p:cTn id="22" dur="1" fill="hold">
+                                          <p:stCondLst>
+                                            <p:cond delay="0"/>
+                                          </p:stCondLst>
+                                        </p:cTn>
+                                        <p:tgtEl>
+                                          <p:spTgt spid="42"/>
+                                        </p:tgtEl>
+                                        <p:attrNameLst>
+                                          <p:attrName>style.visibility</p:attrName>
+                                        </p:attrNameLst>
+                                      </p:cBhvr>
+                                      <p:to>
+                                        <p:strVal val="visible"/>
+                                      </p:to>
+                                    </p:set>
+                                  </p:childTnLst>
+                                </p:cTn>
+                              </p:par>
+                            </p:childTnLst>
+                          </p:cTn>
+                        </p:par>
+                      </p:childTnLst>
+                    </p:cTn>
+                  </p:par>
+                  <p:par>
+                    <p:cTn id="23" fill="hold">
+                      <p:stCondLst>
+                        <p:cond delay="indefinite"/>
+                      </p:stCondLst>
+                      <p:childTnLst>
+                        <p:par>
+                          <p:cTn id="24" fill="hold">
+                            <p:stCondLst>
+                              <p:cond delay="0"/>
+                            </p:stCondLst>
+                            <p:childTnLst>
+                              <p:par>
+                                <p:cTn id="25" presetID="1" presetClass="entr" presetSubtype="0" fill="hold" nodeType="clickEffect">
+                                  <p:stCondLst>
+                                    <p:cond delay="0"/>
+                                  </p:stCondLst>
+                                  <p:childTnLst>
+                                    <p:set>
+                                      <p:cBhvr>
+                                        <p:cTn id="26" dur="1" fill="hold">
+                                          <p:stCondLst>
+                                            <p:cond delay="0"/>
+                                          </p:stCondLst>
+                                        </p:cTn>
+                                        <p:tgtEl>
+                                          <p:spTgt spid="44"/>
+                                        </p:tgtEl>
+                                        <p:attrNameLst>
+                                          <p:attrName>style.visibility</p:attrName>
+                                        </p:attrNameLst>
+                                      </p:cBhvr>
+                                      <p:to>
+                                        <p:strVal val="visible"/>
+                                      </p:to>
+                                    </p:set>
+                                  </p:childTnLst>
+                                </p:cTn>
+                              </p:par>
+                              <p:par>
+                                <p:cTn id="27" presetID="1" presetClass="entr" presetSubtype="0" fill="hold" nodeType="withEffect">
+                                  <p:stCondLst>
+                                    <p:cond delay="0"/>
+                                  </p:stCondLst>
+                                  <p:childTnLst>
+                                    <p:set>
+                                      <p:cBhvr>
+                                        <p:cTn id="28" dur="1" fill="hold">
+                                          <p:stCondLst>
+                                            <p:cond delay="0"/>
+                                          </p:stCondLst>
+                                        </p:cTn>
+                                        <p:tgtEl>
+                                          <p:spTgt spid="45"/>
+                                        </p:tgtEl>
+                                        <p:attrNameLst>
+                                          <p:attrName>style.visibility</p:attrName>
+                                        </p:attrNameLst>
+                                      </p:cBhvr>
+                                      <p:to>
+                                        <p:strVal val="visible"/>
+                                      </p:to>
+                                    </p:set>
+                                  </p:childTnLst>
+                                </p:cTn>
+                              </p:par>
+                              <p:par>
+                                <p:cTn id="29" presetID="1" presetClass="entr" presetSubtype="0" fill="hold" nodeType="withEffect">
+                                  <p:stCondLst>
+                                    <p:cond delay="0"/>
+                                  </p:stCondLst>
+                                  <p:childTnLst>
+                                    <p:set>
+                                      <p:cBhvr>
+                                        <p:cTn id="30" dur="1" fill="hold">
+                                          <p:stCondLst>
+                                            <p:cond delay="0"/>
+                                          </p:stCondLst>
+                                        </p:cTn>
+                                        <p:tgtEl>
+                                          <p:spTgt spid="46"/>
+                                        </p:tgtEl>
+                                        <p:attrNameLst>
+                                          <p:attrName>style.visibility</p:attrName>
+                                        </p:attrNameLst>
+                                      </p:cBhvr>
+                                      <p:to>
+                                        <p:strVal val="visible"/>
+                                      </p:to>
+                                    </p:set>
+                                  </p:childTnLst>
+                                </p:cTn>
+                              </p:par>
+                            </p:childTnLst>
+                          </p:cTn>
+                        </p:par>
+                      </p:childTnLst>
+                    </p:cTn>
+                  </p:par>
+                  <p:par>
+                    <p:cTn id="31" fill="hold">
+                      <p:stCondLst>
+                        <p:cond delay="indefinite"/>
+                      </p:stCondLst>
+                      <p:childTnLst>
+                        <p:par>
+                          <p:cTn id="32" fill="hold">
+                            <p:stCondLst>
+                              <p:cond delay="0"/>
+                            </p:stCondLst>
+                            <p:childTnLst>
+                              <p:par>
+                                <p:cTn id="33" presetID="1" presetClass="entr" presetSubtype="0" fill="hold" nodeType="clickEffect">
+                                  <p:stCondLst>
+                                    <p:cond delay="0"/>
+                                  </p:stCondLst>
+                                  <p:childTnLst>
+                                    <p:set>
+                                      <p:cBhvr>
+                                        <p:cTn id="34" dur="1" fill="hold">
+                                          <p:stCondLst>
+                                            <p:cond delay="0"/>
+                                          </p:stCondLst>
+                                        </p:cTn>
+                                        <p:tgtEl>
+                                          <p:spTgt spid="47"/>
+                                        </p:tgtEl>
+                                        <p:attrNameLst>
+                                          <p:attrName>style.visibility</p:attrName>
+                                        </p:attrNameLst>
+                                      </p:cBhvr>
+                                      <p:to>
+                                        <p:strVal val="visible"/>
+                                      </p:to>
+                                    </p:set>
+                                  </p:childTnLst>
+                                </p:cTn>
+                              </p:par>
+                              <p:par>
+                                <p:cTn id="35" presetID="1" presetClass="entr" presetSubtype="0" fill="hold" nodeType="withEffect">
+                                  <p:stCondLst>
+                                    <p:cond delay="0"/>
+                                  </p:stCondLst>
+                                  <p:childTnLst>
+                                    <p:set>
+                                      <p:cBhvr>
+                                        <p:cTn id="36" dur="1" fill="hold">
+                                          <p:stCondLst>
+                                            <p:cond delay="0"/>
+                                          </p:stCondLst>
+                                        </p:cTn>
+                                        <p:tgtEl>
+                                          <p:spTgt spid="49"/>
+                                        </p:tgtEl>
+                                        <p:attrNameLst>
+                                          <p:attrName>style.visibility</p:attrName>
+                                        </p:attrNameLst>
+                                      </p:cBhvr>
+                                      <p:to>
+                                        <p:strVal val="visible"/>
+                                      </p:to>
+                                    </p:set>
+                                  </p:childTnLst>
+                                </p:cTn>
+                              </p:par>
+                              <p:par>
+                                <p:cTn id="37" presetID="1" presetClass="entr" presetSubtype="0" fill="hold" nodeType="withEffect">
+                                  <p:stCondLst>
+                                    <p:cond delay="0"/>
+                                  </p:stCondLst>
+                                  <p:childTnLst>
+                                    <p:set>
+                                      <p:cBhvr>
+                                        <p:cTn id="38" dur="1" fill="hold">
+                                          <p:stCondLst>
+                                            <p:cond delay="0"/>
+                                          </p:stCondLst>
+                                        </p:cTn>
+                                        <p:tgtEl>
+                                          <p:spTgt spid="51"/>
+                                        </p:tgtEl>
+                                        <p:attrNameLst>
+                                          <p:attrName>style.visibility</p:attrName>
+                                        </p:attrNameLst>
+                                      </p:cBhvr>
+                                      <p:to>
+                                        <p:strVal val="visible"/>
+                                      </p:to>
+                                    </p:set>
+                                  </p:childTnLst>
+                                </p:cTn>
+                              </p:par>
+                            </p:childTnLst>
+                          </p:cTn>
+                        </p:par>
+                      </p:childTnLst>
+                    </p:cTn>
+                  </p:par>
+                </p:childTnLst>
+              </p:cTn>
+              <p:prevCondLst>
+                <p:cond evt="onPrev" delay="0">
+                  <p:tgtEl>
+                    <p:sldTgt/>
+                  </p:tgtEl>
+                </p:cond>
+              </p:prevCondLst>
+              <p:nextCondLst>
+                <p:cond evt="onNext" delay="0">
+                  <p:tgtEl>
+                    <p:sldTgt/>
+                  </p:tgtEl>
+                </p:cond>
+              </p:nextCondLst>
+            </p:seq>
+          </p:childTnLst>
+        </p:cTn>
+      </p:par>
+    </p:tnLst>
+    <p:bldLst>
+      <p:bldP spid="37" grpId="0"/>
+      <p:bldP spid="38" grpId="0"/>
+      <p:bldP spid="39" grpId="0" animBg="1"/>
+    </p:bldLst>
+  </p:timing>
 </p:sld>
 </file>
 

</xml_diff>

<commit_message>
Animation in az cli
</commit_message>
<xml_diff>
--- a/ARM Brown Bag.pptx
+++ b/ARM Brown Bag.pptx
@@ -233,7 +233,7 @@
           <a:p>
             <a:fld id="{C6680278-032E-9143-A67F-47312BD0CE18}" type="datetimeFigureOut">
               <a:rPr lang="en-US" smtClean="0"/>
-              <a:t>3/1/18</a:t>
+              <a:t>3/5/18</a:t>
             </a:fld>
             <a:endParaRPr lang="en-US"/>
           </a:p>
@@ -4621,7 +4621,7 @@
           <a:p>
             <a:fld id="{D91C29D7-D097-7F44-8DA4-EEDA24BF6782}" type="datetimeFigureOut">
               <a:rPr lang="en-US" smtClean="0"/>
-              <a:t>3/1/18</a:t>
+              <a:t>3/5/18</a:t>
             </a:fld>
             <a:endParaRPr lang="en-US"/>
           </a:p>
@@ -4819,7 +4819,7 @@
           <a:p>
             <a:fld id="{D91C29D7-D097-7F44-8DA4-EEDA24BF6782}" type="datetimeFigureOut">
               <a:rPr lang="en-US" smtClean="0"/>
-              <a:t>3/1/18</a:t>
+              <a:t>3/5/18</a:t>
             </a:fld>
             <a:endParaRPr lang="en-US"/>
           </a:p>
@@ -5027,7 +5027,7 @@
           <a:p>
             <a:fld id="{D91C29D7-D097-7F44-8DA4-EEDA24BF6782}" type="datetimeFigureOut">
               <a:rPr lang="en-US" smtClean="0"/>
-              <a:t>3/1/18</a:t>
+              <a:t>3/5/18</a:t>
             </a:fld>
             <a:endParaRPr lang="en-US"/>
           </a:p>
@@ -5225,7 +5225,7 @@
           <a:p>
             <a:fld id="{D91C29D7-D097-7F44-8DA4-EEDA24BF6782}" type="datetimeFigureOut">
               <a:rPr lang="en-US" smtClean="0"/>
-              <a:t>3/1/18</a:t>
+              <a:t>3/5/18</a:t>
             </a:fld>
             <a:endParaRPr lang="en-US"/>
           </a:p>
@@ -5500,7 +5500,7 @@
           <a:p>
             <a:fld id="{D91C29D7-D097-7F44-8DA4-EEDA24BF6782}" type="datetimeFigureOut">
               <a:rPr lang="en-US" smtClean="0"/>
-              <a:t>3/1/18</a:t>
+              <a:t>3/5/18</a:t>
             </a:fld>
             <a:endParaRPr lang="en-US"/>
           </a:p>
@@ -5765,7 +5765,7 @@
           <a:p>
             <a:fld id="{D91C29D7-D097-7F44-8DA4-EEDA24BF6782}" type="datetimeFigureOut">
               <a:rPr lang="en-US" smtClean="0"/>
-              <a:t>3/1/18</a:t>
+              <a:t>3/5/18</a:t>
             </a:fld>
             <a:endParaRPr lang="en-US"/>
           </a:p>
@@ -6177,7 +6177,7 @@
           <a:p>
             <a:fld id="{D91C29D7-D097-7F44-8DA4-EEDA24BF6782}" type="datetimeFigureOut">
               <a:rPr lang="en-US" smtClean="0"/>
-              <a:t>3/1/18</a:t>
+              <a:t>3/5/18</a:t>
             </a:fld>
             <a:endParaRPr lang="en-US"/>
           </a:p>
@@ -6318,7 +6318,7 @@
           <a:p>
             <a:fld id="{D91C29D7-D097-7F44-8DA4-EEDA24BF6782}" type="datetimeFigureOut">
               <a:rPr lang="en-US" smtClean="0"/>
-              <a:t>3/1/18</a:t>
+              <a:t>3/5/18</a:t>
             </a:fld>
             <a:endParaRPr lang="en-US"/>
           </a:p>
@@ -6431,7 +6431,7 @@
           <a:p>
             <a:fld id="{D91C29D7-D097-7F44-8DA4-EEDA24BF6782}" type="datetimeFigureOut">
               <a:rPr lang="en-US" smtClean="0"/>
-              <a:t>3/1/18</a:t>
+              <a:t>3/5/18</a:t>
             </a:fld>
             <a:endParaRPr lang="en-US"/>
           </a:p>
@@ -6742,7 +6742,7 @@
           <a:p>
             <a:fld id="{D91C29D7-D097-7F44-8DA4-EEDA24BF6782}" type="datetimeFigureOut">
               <a:rPr lang="en-US" smtClean="0"/>
-              <a:t>3/1/18</a:t>
+              <a:t>3/5/18</a:t>
             </a:fld>
             <a:endParaRPr lang="en-US"/>
           </a:p>
@@ -7030,7 +7030,7 @@
           <a:p>
             <a:fld id="{D91C29D7-D097-7F44-8DA4-EEDA24BF6782}" type="datetimeFigureOut">
               <a:rPr lang="en-US" smtClean="0"/>
-              <a:t>3/1/18</a:t>
+              <a:t>3/5/18</a:t>
             </a:fld>
             <a:endParaRPr lang="en-US"/>
           </a:p>
@@ -7271,7 +7271,7 @@
           <a:p>
             <a:fld id="{D91C29D7-D097-7F44-8DA4-EEDA24BF6782}" type="datetimeFigureOut">
               <a:rPr lang="en-US" smtClean="0"/>
-              <a:t>3/1/18</a:t>
+              <a:t>3/5/18</a:t>
             </a:fld>
             <a:endParaRPr lang="en-US"/>
           </a:p>
@@ -15027,6 +15027,241 @@
                                           <p:spTgt spid="6">
                                             <p:txEl>
                                               <p:pRg st="2" end="2"/>
+                                            </p:txEl>
+                                          </p:spTgt>
+                                        </p:tgtEl>
+                                        <p:attrNameLst>
+                                          <p:attrName>style.visibility</p:attrName>
+                                        </p:attrNameLst>
+                                      </p:cBhvr>
+                                      <p:to>
+                                        <p:strVal val="visible"/>
+                                      </p:to>
+                                    </p:set>
+                                  </p:childTnLst>
+                                </p:cTn>
+                              </p:par>
+                            </p:childTnLst>
+                          </p:cTn>
+                        </p:par>
+                      </p:childTnLst>
+                    </p:cTn>
+                  </p:par>
+                  <p:par>
+                    <p:cTn id="11" fill="hold">
+                      <p:stCondLst>
+                        <p:cond delay="indefinite"/>
+                      </p:stCondLst>
+                      <p:childTnLst>
+                        <p:par>
+                          <p:cTn id="12" fill="hold">
+                            <p:stCondLst>
+                              <p:cond delay="0"/>
+                            </p:stCondLst>
+                            <p:childTnLst>
+                              <p:par>
+                                <p:cTn id="13" presetID="1" presetClass="entr" presetSubtype="0" fill="hold" nodeType="clickEffect">
+                                  <p:stCondLst>
+                                    <p:cond delay="0"/>
+                                  </p:stCondLst>
+                                  <p:childTnLst>
+                                    <p:set>
+                                      <p:cBhvr>
+                                        <p:cTn id="14" dur="1" fill="hold">
+                                          <p:stCondLst>
+                                            <p:cond delay="0"/>
+                                          </p:stCondLst>
+                                        </p:cTn>
+                                        <p:tgtEl>
+                                          <p:spTgt spid="6">
+                                            <p:txEl>
+                                              <p:pRg st="4" end="4"/>
+                                            </p:txEl>
+                                          </p:spTgt>
+                                        </p:tgtEl>
+                                        <p:attrNameLst>
+                                          <p:attrName>style.visibility</p:attrName>
+                                        </p:attrNameLst>
+                                      </p:cBhvr>
+                                      <p:to>
+                                        <p:strVal val="visible"/>
+                                      </p:to>
+                                    </p:set>
+                                  </p:childTnLst>
+                                </p:cTn>
+                              </p:par>
+                              <p:par>
+                                <p:cTn id="15" presetID="1" presetClass="entr" presetSubtype="0" fill="hold" nodeType="withEffect">
+                                  <p:stCondLst>
+                                    <p:cond delay="0"/>
+                                  </p:stCondLst>
+                                  <p:childTnLst>
+                                    <p:set>
+                                      <p:cBhvr>
+                                        <p:cTn id="16" dur="1" fill="hold">
+                                          <p:stCondLst>
+                                            <p:cond delay="0"/>
+                                          </p:stCondLst>
+                                        </p:cTn>
+                                        <p:tgtEl>
+                                          <p:spTgt spid="6">
+                                            <p:txEl>
+                                              <p:pRg st="5" end="5"/>
+                                            </p:txEl>
+                                          </p:spTgt>
+                                        </p:tgtEl>
+                                        <p:attrNameLst>
+                                          <p:attrName>style.visibility</p:attrName>
+                                        </p:attrNameLst>
+                                      </p:cBhvr>
+                                      <p:to>
+                                        <p:strVal val="visible"/>
+                                      </p:to>
+                                    </p:set>
+                                  </p:childTnLst>
+                                </p:cTn>
+                              </p:par>
+                              <p:par>
+                                <p:cTn id="17" presetID="1" presetClass="entr" presetSubtype="0" fill="hold" nodeType="withEffect">
+                                  <p:stCondLst>
+                                    <p:cond delay="0"/>
+                                  </p:stCondLst>
+                                  <p:childTnLst>
+                                    <p:set>
+                                      <p:cBhvr>
+                                        <p:cTn id="18" dur="1" fill="hold">
+                                          <p:stCondLst>
+                                            <p:cond delay="0"/>
+                                          </p:stCondLst>
+                                        </p:cTn>
+                                        <p:tgtEl>
+                                          <p:spTgt spid="6">
+                                            <p:txEl>
+                                              <p:pRg st="6" end="6"/>
+                                            </p:txEl>
+                                          </p:spTgt>
+                                        </p:tgtEl>
+                                        <p:attrNameLst>
+                                          <p:attrName>style.visibility</p:attrName>
+                                        </p:attrNameLst>
+                                      </p:cBhvr>
+                                      <p:to>
+                                        <p:strVal val="visible"/>
+                                      </p:to>
+                                    </p:set>
+                                  </p:childTnLst>
+                                </p:cTn>
+                              </p:par>
+                              <p:par>
+                                <p:cTn id="19" presetID="1" presetClass="entr" presetSubtype="0" fill="hold" nodeType="withEffect">
+                                  <p:stCondLst>
+                                    <p:cond delay="0"/>
+                                  </p:stCondLst>
+                                  <p:childTnLst>
+                                    <p:set>
+                                      <p:cBhvr>
+                                        <p:cTn id="20" dur="1" fill="hold">
+                                          <p:stCondLst>
+                                            <p:cond delay="0"/>
+                                          </p:stCondLst>
+                                        </p:cTn>
+                                        <p:tgtEl>
+                                          <p:spTgt spid="6">
+                                            <p:txEl>
+                                              <p:pRg st="7" end="7"/>
+                                            </p:txEl>
+                                          </p:spTgt>
+                                        </p:tgtEl>
+                                        <p:attrNameLst>
+                                          <p:attrName>style.visibility</p:attrName>
+                                        </p:attrNameLst>
+                                      </p:cBhvr>
+                                      <p:to>
+                                        <p:strVal val="visible"/>
+                                      </p:to>
+                                    </p:set>
+                                  </p:childTnLst>
+                                </p:cTn>
+                              </p:par>
+                              <p:par>
+                                <p:cTn id="21" presetID="1" presetClass="entr" presetSubtype="0" fill="hold" nodeType="withEffect">
+                                  <p:stCondLst>
+                                    <p:cond delay="0"/>
+                                  </p:stCondLst>
+                                  <p:childTnLst>
+                                    <p:set>
+                                      <p:cBhvr>
+                                        <p:cTn id="22" dur="1" fill="hold">
+                                          <p:stCondLst>
+                                            <p:cond delay="0"/>
+                                          </p:stCondLst>
+                                        </p:cTn>
+                                        <p:tgtEl>
+                                          <p:spTgt spid="6">
+                                            <p:txEl>
+                                              <p:pRg st="8" end="8"/>
+                                            </p:txEl>
+                                          </p:spTgt>
+                                        </p:tgtEl>
+                                        <p:attrNameLst>
+                                          <p:attrName>style.visibility</p:attrName>
+                                        </p:attrNameLst>
+                                      </p:cBhvr>
+                                      <p:to>
+                                        <p:strVal val="visible"/>
+                                      </p:to>
+                                    </p:set>
+                                  </p:childTnLst>
+                                </p:cTn>
+                              </p:par>
+                              <p:par>
+                                <p:cTn id="23" presetID="1" presetClass="entr" presetSubtype="0" fill="hold" nodeType="withEffect">
+                                  <p:stCondLst>
+                                    <p:cond delay="0"/>
+                                  </p:stCondLst>
+                                  <p:childTnLst>
+                                    <p:set>
+                                      <p:cBhvr>
+                                        <p:cTn id="24" dur="1" fill="hold">
+                                          <p:stCondLst>
+                                            <p:cond delay="0"/>
+                                          </p:stCondLst>
+                                        </p:cTn>
+                                        <p:tgtEl>
+                                          <p:spTgt spid="6">
+                                            <p:txEl>
+                                              <p:pRg st="9" end="9"/>
+                                            </p:txEl>
+                                          </p:spTgt>
+                                        </p:tgtEl>
+                                        <p:attrNameLst>
+                                          <p:attrName>style.visibility</p:attrName>
+                                        </p:attrNameLst>
+                                      </p:cBhvr>
+                                      <p:to>
+                                        <p:strVal val="visible"/>
+                                      </p:to>
+                                    </p:set>
+                                  </p:childTnLst>
+                                </p:cTn>
+                              </p:par>
+                              <p:par>
+                                <p:cTn id="25" presetID="1" presetClass="entr" presetSubtype="0" fill="hold" nodeType="withEffect">
+                                  <p:stCondLst>
+                                    <p:cond delay="0"/>
+                                  </p:stCondLst>
+                                  <p:childTnLst>
+                                    <p:set>
+                                      <p:cBhvr>
+                                        <p:cTn id="26" dur="1" fill="hold">
+                                          <p:stCondLst>
+                                            <p:cond delay="0"/>
+                                          </p:stCondLst>
+                                        </p:cTn>
+                                        <p:tgtEl>
+                                          <p:spTgt spid="6">
+                                            <p:txEl>
+                                              <p:pRg st="10" end="10"/>
                                             </p:txEl>
                                           </p:spTgt>
                                         </p:tgtEl>

</xml_diff>